<commit_message>
Refresh HTA & STN
</commit_message>
<xml_diff>
--- a/Report/STN.pptx
+++ b/Report/STN.pptx
@@ -262,7 +262,7 @@
           <a:p>
             <a:fld id="{D8AB7135-980F-4175-B31C-ED3383C07D5F}" type="datetimeFigureOut">
               <a:rPr lang="it-IT" smtClean="0"/>
-              <a:t>08/05/2020</a:t>
+              <a:t>21/05/2020</a:t>
             </a:fld>
             <a:endParaRPr lang="it-IT"/>
           </a:p>
@@ -460,7 +460,7 @@
           <a:p>
             <a:fld id="{D8AB7135-980F-4175-B31C-ED3383C07D5F}" type="datetimeFigureOut">
               <a:rPr lang="it-IT" smtClean="0"/>
-              <a:t>08/05/2020</a:t>
+              <a:t>21/05/2020</a:t>
             </a:fld>
             <a:endParaRPr lang="it-IT"/>
           </a:p>
@@ -668,7 +668,7 @@
           <a:p>
             <a:fld id="{D8AB7135-980F-4175-B31C-ED3383C07D5F}" type="datetimeFigureOut">
               <a:rPr lang="it-IT" smtClean="0"/>
-              <a:t>08/05/2020</a:t>
+              <a:t>21/05/2020</a:t>
             </a:fld>
             <a:endParaRPr lang="it-IT"/>
           </a:p>
@@ -866,7 +866,7 @@
           <a:p>
             <a:fld id="{D8AB7135-980F-4175-B31C-ED3383C07D5F}" type="datetimeFigureOut">
               <a:rPr lang="it-IT" smtClean="0"/>
-              <a:t>08/05/2020</a:t>
+              <a:t>21/05/2020</a:t>
             </a:fld>
             <a:endParaRPr lang="it-IT"/>
           </a:p>
@@ -1141,7 +1141,7 @@
           <a:p>
             <a:fld id="{D8AB7135-980F-4175-B31C-ED3383C07D5F}" type="datetimeFigureOut">
               <a:rPr lang="it-IT" smtClean="0"/>
-              <a:t>08/05/2020</a:t>
+              <a:t>21/05/2020</a:t>
             </a:fld>
             <a:endParaRPr lang="it-IT"/>
           </a:p>
@@ -1406,7 +1406,7 @@
           <a:p>
             <a:fld id="{D8AB7135-980F-4175-B31C-ED3383C07D5F}" type="datetimeFigureOut">
               <a:rPr lang="it-IT" smtClean="0"/>
-              <a:t>08/05/2020</a:t>
+              <a:t>21/05/2020</a:t>
             </a:fld>
             <a:endParaRPr lang="it-IT"/>
           </a:p>
@@ -1818,7 +1818,7 @@
           <a:p>
             <a:fld id="{D8AB7135-980F-4175-B31C-ED3383C07D5F}" type="datetimeFigureOut">
               <a:rPr lang="it-IT" smtClean="0"/>
-              <a:t>08/05/2020</a:t>
+              <a:t>21/05/2020</a:t>
             </a:fld>
             <a:endParaRPr lang="it-IT"/>
           </a:p>
@@ -1959,7 +1959,7 @@
           <a:p>
             <a:fld id="{D8AB7135-980F-4175-B31C-ED3383C07D5F}" type="datetimeFigureOut">
               <a:rPr lang="it-IT" smtClean="0"/>
-              <a:t>08/05/2020</a:t>
+              <a:t>21/05/2020</a:t>
             </a:fld>
             <a:endParaRPr lang="it-IT"/>
           </a:p>
@@ -2072,7 +2072,7 @@
           <a:p>
             <a:fld id="{D8AB7135-980F-4175-B31C-ED3383C07D5F}" type="datetimeFigureOut">
               <a:rPr lang="it-IT" smtClean="0"/>
-              <a:t>08/05/2020</a:t>
+              <a:t>21/05/2020</a:t>
             </a:fld>
             <a:endParaRPr lang="it-IT"/>
           </a:p>
@@ -2383,7 +2383,7 @@
           <a:p>
             <a:fld id="{D8AB7135-980F-4175-B31C-ED3383C07D5F}" type="datetimeFigureOut">
               <a:rPr lang="it-IT" smtClean="0"/>
-              <a:t>08/05/2020</a:t>
+              <a:t>21/05/2020</a:t>
             </a:fld>
             <a:endParaRPr lang="it-IT"/>
           </a:p>
@@ -2671,7 +2671,7 @@
           <a:p>
             <a:fld id="{D8AB7135-980F-4175-B31C-ED3383C07D5F}" type="datetimeFigureOut">
               <a:rPr lang="it-IT" smtClean="0"/>
-              <a:t>08/05/2020</a:t>
+              <a:t>21/05/2020</a:t>
             </a:fld>
             <a:endParaRPr lang="it-IT"/>
           </a:p>
@@ -2912,7 +2912,7 @@
           <a:p>
             <a:fld id="{D8AB7135-980F-4175-B31C-ED3383C07D5F}" type="datetimeFigureOut">
               <a:rPr lang="it-IT" smtClean="0"/>
-              <a:t>08/05/2020</a:t>
+              <a:t>21/05/2020</a:t>
             </a:fld>
             <a:endParaRPr lang="it-IT"/>
           </a:p>
@@ -3343,8 +3343,8 @@
         </p:nvSpPr>
         <p:spPr>
           <a:xfrm>
-            <a:off x="1486637" y="1663828"/>
-            <a:ext cx="1132514" cy="640709"/>
+            <a:off x="1486637" y="1663829"/>
+            <a:ext cx="1054097" cy="546542"/>
           </a:xfrm>
           <a:prstGeom prst="ellipse">
             <a:avLst/>
@@ -3397,8 +3397,8 @@
         </p:nvSpPr>
         <p:spPr>
           <a:xfrm>
-            <a:off x="1557944" y="1719930"/>
-            <a:ext cx="989901" cy="528507"/>
+            <a:off x="1557944" y="1719931"/>
+            <a:ext cx="921359" cy="450830"/>
           </a:xfrm>
           <a:prstGeom prst="ellipse">
             <a:avLst/>
@@ -3434,13 +3434,18 @@
           <a:p>
             <a:pPr algn="ctr"/>
             <a:r>
-              <a:rPr lang="it-IT" dirty="0">
+              <a:rPr lang="it-IT" sz="1400" b="1" dirty="0">
                 <a:solidFill>
                   <a:schemeClr val="tx1"/>
                 </a:solidFill>
               </a:rPr>
               <a:t>Start</a:t>
             </a:r>
+            <a:endParaRPr lang="it-IT" sz="1200" b="1" dirty="0">
+              <a:solidFill>
+                <a:schemeClr val="tx1"/>
+              </a:solidFill>
+            </a:endParaRPr>
           </a:p>
         </p:txBody>
       </p:sp>
@@ -3474,13 +3479,8 @@
           <a:p>
             <a:r>
               <a:rPr lang="it-IT" sz="4000" dirty="0"/>
-              <a:t>STN Operator: </a:t>
-            </a:r>
-            <a:r>
-              <a:rPr lang="it-IT" sz="4000" dirty="0" err="1"/>
-              <a:t>Registration</a:t>
-            </a:r>
-            <a:endParaRPr lang="it-IT" sz="4000" dirty="0"/>
+              <a:t>STN Operator: Registration</a:t>
+            </a:r>
           </a:p>
         </p:txBody>
       </p:sp>
@@ -3494,14 +3494,16 @@
             </a:extLst>
           </p:cNvPr>
           <p:cNvCxnSpPr>
+            <a:cxnSpLocks/>
             <a:stCxn id="6" idx="6"/>
+            <a:endCxn id="34" idx="2"/>
           </p:cNvCxnSpPr>
           <p:nvPr/>
         </p:nvCxnSpPr>
         <p:spPr>
           <a:xfrm flipV="1">
-            <a:off x="2619151" y="1984182"/>
-            <a:ext cx="1097410" cy="1"/>
+            <a:off x="2540734" y="1937099"/>
+            <a:ext cx="1175825" cy="1"/>
           </a:xfrm>
           <a:prstGeom prst="straightConnector1">
             <a:avLst/>
@@ -3542,8 +3544,8 @@
         </p:nvSpPr>
         <p:spPr>
           <a:xfrm>
-            <a:off x="2771753" y="1645628"/>
-            <a:ext cx="792205" cy="338554"/>
+            <a:off x="2771754" y="1645628"/>
+            <a:ext cx="737352" cy="461665"/>
           </a:xfrm>
           <a:prstGeom prst="rect">
             <a:avLst/>
@@ -3551,7 +3553,7 @@
           <a:noFill/>
         </p:spPr>
         <p:txBody>
-          <a:bodyPr wrap="none" rtlCol="0">
+          <a:bodyPr wrap="square" rtlCol="0">
             <a:spAutoFit/>
           </a:bodyPr>
           <a:lstStyle/>
@@ -3585,8 +3587,8 @@
         </p:nvSpPr>
         <p:spPr>
           <a:xfrm>
-            <a:off x="3716559" y="1663828"/>
-            <a:ext cx="1417741" cy="640707"/>
+            <a:off x="3716559" y="1663829"/>
+            <a:ext cx="1319575" cy="546540"/>
           </a:xfrm>
           <a:prstGeom prst="ellipse">
             <a:avLst/>
@@ -3622,7 +3624,7 @@
           <a:p>
             <a:pPr algn="ctr"/>
             <a:r>
-              <a:rPr lang="it-IT" sz="1600" dirty="0">
+              <a:rPr lang="it-IT" sz="1200" dirty="0">
                 <a:solidFill>
                   <a:schemeClr val="tx1"/>
                 </a:solidFill>
@@ -3646,8 +3648,8 @@
         </p:nvSpPr>
         <p:spPr>
           <a:xfrm>
-            <a:off x="6231708" y="1637867"/>
-            <a:ext cx="1417741" cy="640707"/>
+            <a:off x="6231708" y="1637868"/>
+            <a:ext cx="1319575" cy="546540"/>
           </a:xfrm>
           <a:prstGeom prst="ellipse">
             <a:avLst/>
@@ -3683,20 +3685,12 @@
           <a:p>
             <a:pPr algn="ctr"/>
             <a:r>
-              <a:rPr lang="it-IT" sz="1600" dirty="0" err="1">
+              <a:rPr lang="it-IT" sz="1200" dirty="0">
                 <a:solidFill>
                   <a:schemeClr val="tx1"/>
                 </a:solidFill>
               </a:rPr>
-              <a:t>Contacts</a:t>
-            </a:r>
-            <a:r>
-              <a:rPr lang="it-IT" sz="1600" dirty="0">
-                <a:solidFill>
-                  <a:schemeClr val="tx1"/>
-                </a:solidFill>
-              </a:rPr>
-              <a:t> list</a:t>
+              <a:t>Contacts list</a:t>
             </a:r>
           </a:p>
         </p:txBody>
@@ -3710,13 +3704,15 @@
               </a:ext>
             </a:extLst>
           </p:cNvPr>
-          <p:cNvCxnSpPr/>
+          <p:cNvCxnSpPr>
+            <a:cxnSpLocks/>
+          </p:cNvCxnSpPr>
           <p:nvPr/>
         </p:nvCxnSpPr>
         <p:spPr>
           <a:xfrm flipV="1">
             <a:off x="5134300" y="1958221"/>
-            <a:ext cx="1097410" cy="1"/>
+            <a:ext cx="1021424" cy="3"/>
           </a:xfrm>
           <a:prstGeom prst="straightConnector1">
             <a:avLst/>
@@ -3758,7 +3754,7 @@
         <p:spPr>
           <a:xfrm>
             <a:off x="5254759" y="1637867"/>
-            <a:ext cx="780983" cy="338554"/>
+            <a:ext cx="726907" cy="584775"/>
           </a:xfrm>
           <a:prstGeom prst="rect">
             <a:avLst/>
@@ -3766,7 +3762,7 @@
           <a:noFill/>
         </p:spPr>
         <p:txBody>
-          <a:bodyPr wrap="none" rtlCol="0">
+          <a:bodyPr wrap="square" rtlCol="0">
             <a:spAutoFit/>
           </a:bodyPr>
           <a:lstStyle/>
@@ -3800,8 +3796,8 @@
         </p:nvSpPr>
         <p:spPr>
           <a:xfrm>
-            <a:off x="6614946" y="1015542"/>
-            <a:ext cx="663964" cy="338554"/>
+            <a:off x="6557846" y="1107910"/>
+            <a:ext cx="683141" cy="338554"/>
           </a:xfrm>
           <a:prstGeom prst="rect">
             <a:avLst/>
@@ -3809,7 +3805,7 @@
           <a:noFill/>
         </p:spPr>
         <p:txBody>
-          <a:bodyPr wrap="none" rtlCol="0">
+          <a:bodyPr wrap="square" rtlCol="0">
             <a:spAutoFit/>
           </a:bodyPr>
           <a:lstStyle/>
@@ -3824,15 +3820,7 @@
             <a:pPr algn="ctr"/>
             <a:r>
               <a:rPr lang="it-IT" sz="800" dirty="0"/>
-              <a:t>‘</a:t>
-            </a:r>
-            <a:r>
-              <a:rPr lang="it-IT" sz="800" dirty="0" err="1"/>
-              <a:t>ColligoBot</a:t>
-            </a:r>
-            <a:r>
-              <a:rPr lang="it-IT" sz="800" dirty="0"/>
-              <a:t>’</a:t>
+              <a:t>‘ColligoBot’</a:t>
             </a:r>
           </a:p>
         </p:txBody>
@@ -3846,13 +3834,15 @@
               </a:ext>
             </a:extLst>
           </p:cNvPr>
-          <p:cNvCxnSpPr/>
+          <p:cNvCxnSpPr>
+            <a:cxnSpLocks/>
+          </p:cNvCxnSpPr>
           <p:nvPr/>
         </p:nvCxnSpPr>
         <p:spPr>
           <a:xfrm flipV="1">
             <a:off x="7649447" y="1958219"/>
-            <a:ext cx="1097410" cy="1"/>
+            <a:ext cx="1021424" cy="3"/>
           </a:xfrm>
           <a:prstGeom prst="straightConnector1">
             <a:avLst/>
@@ -3893,8 +3883,8 @@
         </p:nvSpPr>
         <p:spPr>
           <a:xfrm>
-            <a:off x="8750251" y="1663828"/>
-            <a:ext cx="1417741" cy="640707"/>
+            <a:off x="8750251" y="1663829"/>
+            <a:ext cx="1319575" cy="546540"/>
           </a:xfrm>
           <a:prstGeom prst="ellipse">
             <a:avLst/>
@@ -3930,7 +3920,7 @@
           <a:p>
             <a:pPr algn="ctr"/>
             <a:r>
-              <a:rPr lang="it-IT" sz="1600" dirty="0">
+              <a:rPr lang="it-IT" sz="1200" dirty="0">
                 <a:solidFill>
                   <a:schemeClr val="tx1"/>
                 </a:solidFill>
@@ -3954,8 +3944,8 @@
         </p:nvSpPr>
         <p:spPr>
           <a:xfrm>
-            <a:off x="533861" y="3068310"/>
-            <a:ext cx="1417741" cy="640707"/>
+            <a:off x="533861" y="3068311"/>
+            <a:ext cx="1319575" cy="546540"/>
           </a:xfrm>
           <a:prstGeom prst="ellipse">
             <a:avLst/>
@@ -3991,7 +3981,7 @@
           <a:p>
             <a:pPr algn="ctr"/>
             <a:r>
-              <a:rPr lang="it-IT" sz="1600" dirty="0">
+              <a:rPr lang="it-IT" sz="1200" dirty="0">
                 <a:solidFill>
                   <a:schemeClr val="tx1"/>
                 </a:solidFill>
@@ -4015,8 +4005,8 @@
         </p:nvSpPr>
         <p:spPr>
           <a:xfrm>
-            <a:off x="8198152" y="4988856"/>
-            <a:ext cx="1417741" cy="640707"/>
+            <a:off x="8198152" y="4988857"/>
+            <a:ext cx="1319575" cy="546540"/>
           </a:xfrm>
           <a:prstGeom prst="ellipse">
             <a:avLst/>
@@ -4052,20 +4042,12 @@
           <a:p>
             <a:pPr algn="ctr"/>
             <a:r>
-              <a:rPr lang="it-IT" sz="1600" dirty="0" err="1">
+              <a:rPr lang="it-IT" sz="1200" dirty="0">
                 <a:solidFill>
                   <a:schemeClr val="tx1"/>
                 </a:solidFill>
               </a:rPr>
-              <a:t>Contacts</a:t>
-            </a:r>
-            <a:r>
-              <a:rPr lang="it-IT" sz="1600" dirty="0">
-                <a:solidFill>
-                  <a:schemeClr val="tx1"/>
-                </a:solidFill>
-              </a:rPr>
-              <a:t> list</a:t>
+              <a:t>Position settings</a:t>
             </a:r>
           </a:p>
         </p:txBody>
@@ -4084,8 +4066,8 @@
         </p:nvSpPr>
         <p:spPr>
           <a:xfrm>
-            <a:off x="9176718" y="3082618"/>
-            <a:ext cx="1758448" cy="640707"/>
+            <a:off x="9176718" y="3058086"/>
+            <a:ext cx="1636691" cy="546540"/>
           </a:xfrm>
           <a:prstGeom prst="ellipse">
             <a:avLst/>
@@ -4121,28 +4103,12 @@
           <a:p>
             <a:pPr algn="ctr"/>
             <a:r>
-              <a:rPr lang="it-IT" sz="1600" dirty="0">
+              <a:rPr lang="it-IT" sz="1200" dirty="0">
                 <a:solidFill>
                   <a:schemeClr val="tx1"/>
                 </a:solidFill>
               </a:rPr>
-              <a:t>‘Admin </a:t>
-            </a:r>
-            <a:r>
-              <a:rPr lang="it-IT" sz="1600" dirty="0" err="1">
-                <a:solidFill>
-                  <a:schemeClr val="tx1"/>
-                </a:solidFill>
-              </a:rPr>
-              <a:t>Rights</a:t>
-            </a:r>
-            <a:r>
-              <a:rPr lang="it-IT" sz="1600" dirty="0">
-                <a:solidFill>
-                  <a:schemeClr val="tx1"/>
-                </a:solidFill>
-              </a:rPr>
-              <a:t>’ panel</a:t>
+              <a:t>‘Admin Rights’ panel</a:t>
             </a:r>
           </a:p>
         </p:txBody>
@@ -4158,19 +4124,17 @@
           </p:cNvPr>
           <p:cNvCxnSpPr>
             <a:cxnSpLocks/>
-            <a:stCxn id="35" idx="1"/>
-            <a:endCxn id="35" idx="7"/>
           </p:cNvCxnSpPr>
           <p:nvPr/>
         </p:nvCxnSpPr>
         <p:spPr>
           <a:xfrm rot="5400000" flipH="1" flipV="1">
-            <a:off x="6940578" y="1230449"/>
-            <a:ext cx="12700" cy="1002495"/>
+            <a:off x="6893067" y="1252641"/>
+            <a:ext cx="12700" cy="933081"/>
           </a:xfrm>
           <a:prstGeom prst="curvedConnector3">
             <a:avLst>
-              <a:gd name="adj1" fmla="val 5643378"/>
+              <a:gd name="adj1" fmla="val 4676094"/>
             </a:avLst>
           </a:prstGeom>
           <a:ln>
@@ -4210,7 +4174,7 @@
         <p:spPr>
           <a:xfrm>
             <a:off x="9202478" y="1106122"/>
-            <a:ext cx="513281" cy="215444"/>
+            <a:ext cx="477741" cy="338554"/>
           </a:xfrm>
           <a:prstGeom prst="rect">
             <a:avLst/>
@@ -4218,19 +4182,15 @@
           <a:noFill/>
         </p:spPr>
         <p:txBody>
-          <a:bodyPr wrap="none" rtlCol="0">
+          <a:bodyPr wrap="square" rtlCol="0">
             <a:spAutoFit/>
           </a:bodyPr>
           <a:lstStyle/>
           <a:p>
             <a:pPr algn="ctr"/>
             <a:r>
-              <a:rPr lang="it-IT" sz="800" dirty="0" err="1"/>
-              <a:t>Fill</a:t>
-            </a:r>
-            <a:r>
               <a:rPr lang="it-IT" sz="800" dirty="0"/>
-              <a:t> data</a:t>
+              <a:t>Fill data</a:t>
             </a:r>
           </a:p>
         </p:txBody>
@@ -4248,9 +4208,9 @@
           <p:nvPr/>
         </p:nvSpPr>
         <p:spPr>
-          <a:xfrm rot="1292281">
-            <a:off x="5543093" y="5258224"/>
-            <a:ext cx="947696" cy="338554"/>
+          <a:xfrm rot="1540259">
+            <a:off x="5441163" y="5226356"/>
+            <a:ext cx="990067" cy="338554"/>
           </a:xfrm>
           <a:prstGeom prst="rect">
             <a:avLst/>
@@ -4258,7 +4218,7 @@
           <a:noFill/>
         </p:spPr>
         <p:txBody>
-          <a:bodyPr wrap="none" rtlCol="0">
+          <a:bodyPr wrap="square" rtlCol="0">
             <a:spAutoFit/>
           </a:bodyPr>
           <a:lstStyle/>
@@ -4293,7 +4253,7 @@
         <p:spPr>
           <a:xfrm>
             <a:off x="7774206" y="1645628"/>
-            <a:ext cx="801822" cy="338554"/>
+            <a:ext cx="746303" cy="461665"/>
           </a:xfrm>
           <a:prstGeom prst="rect">
             <a:avLst/>
@@ -4301,7 +4261,7 @@
           <a:noFill/>
         </p:spPr>
         <p:txBody>
-          <a:bodyPr wrap="none" rtlCol="0">
+          <a:bodyPr wrap="square" rtlCol="0">
             <a:spAutoFit/>
           </a:bodyPr>
           <a:lstStyle/>
@@ -4335,8 +4295,8 @@
         </p:nvSpPr>
         <p:spPr>
           <a:xfrm rot="21259317">
-            <a:off x="4217444" y="2552327"/>
-            <a:ext cx="1226618" cy="215444"/>
+            <a:off x="4177758" y="2419924"/>
+            <a:ext cx="1141686" cy="338554"/>
           </a:xfrm>
           <a:prstGeom prst="rect">
             <a:avLst/>
@@ -4344,7 +4304,7 @@
           <a:noFill/>
         </p:spPr>
         <p:txBody>
-          <a:bodyPr wrap="none" rtlCol="0">
+          <a:bodyPr wrap="square" rtlCol="0">
             <a:spAutoFit/>
           </a:bodyPr>
           <a:lstStyle/>
@@ -4352,15 +4312,7 @@
             <a:pPr algn="ctr"/>
             <a:r>
               <a:rPr lang="it-IT" sz="800" dirty="0"/>
-              <a:t>Click on ‘</a:t>
-            </a:r>
-            <a:r>
-              <a:rPr lang="it-IT" sz="800" dirty="0" err="1"/>
-              <a:t>Confirm</a:t>
-            </a:r>
-            <a:r>
-              <a:rPr lang="it-IT" sz="800" dirty="0"/>
-              <a:t>’ botton</a:t>
+              <a:t>Click on ‘Confirm’ botton</a:t>
             </a:r>
           </a:p>
         </p:txBody>
@@ -4376,17 +4328,19 @@
           </p:cNvPr>
           <p:cNvCxnSpPr>
             <a:cxnSpLocks/>
+            <a:stCxn id="41" idx="7"/>
+            <a:endCxn id="41" idx="1"/>
           </p:cNvCxnSpPr>
           <p:nvPr/>
         </p:nvCxnSpPr>
         <p:spPr>
-          <a:xfrm rot="5400000" flipH="1" flipV="1">
-            <a:off x="9452769" y="1289601"/>
-            <a:ext cx="12700" cy="1002495"/>
+          <a:xfrm rot="16200000" flipV="1">
+            <a:off x="9410039" y="1277327"/>
+            <a:ext cx="12700" cy="933081"/>
           </a:xfrm>
           <a:prstGeom prst="curvedConnector3">
             <a:avLst>
-              <a:gd name="adj1" fmla="val 5775488"/>
+              <a:gd name="adj1" fmla="val 5006354"/>
             </a:avLst>
           </a:prstGeom>
           <a:ln>
@@ -4422,15 +4376,13 @@
           </p:cNvPr>
           <p:cNvCxnSpPr>
             <a:cxnSpLocks/>
-            <a:stCxn id="41" idx="4"/>
-            <a:endCxn id="42" idx="0"/>
           </p:cNvCxnSpPr>
           <p:nvPr/>
         </p:nvCxnSpPr>
         <p:spPr>
           <a:xfrm flipH="1">
-            <a:off x="1242732" y="2304535"/>
-            <a:ext cx="8216390" cy="763775"/>
+            <a:off x="1224958" y="2201733"/>
+            <a:ext cx="8216390" cy="857942"/>
           </a:xfrm>
           <a:prstGeom prst="straightConnector1">
             <a:avLst/>
@@ -4475,8 +4427,8 @@
         </p:nvCxnSpPr>
         <p:spPr>
           <a:xfrm>
-            <a:off x="4972603" y="5128504"/>
-            <a:ext cx="1801507" cy="789005"/>
+            <a:off x="4894818" y="5034338"/>
+            <a:ext cx="1837180" cy="883172"/>
           </a:xfrm>
           <a:prstGeom prst="straightConnector1">
             <a:avLst/>
@@ -4521,8 +4473,8 @@
         </p:nvCxnSpPr>
         <p:spPr>
           <a:xfrm>
-            <a:off x="1242731" y="5143511"/>
-            <a:ext cx="2023094" cy="687154"/>
+            <a:off x="1168339" y="5044933"/>
+            <a:ext cx="2097486" cy="738649"/>
           </a:xfrm>
           <a:prstGeom prst="straightConnector1">
             <a:avLst/>
@@ -4558,13 +4510,17 @@
               </a:ext>
             </a:extLst>
           </p:cNvPr>
-          <p:cNvCxnSpPr/>
+          <p:cNvCxnSpPr>
+            <a:cxnSpLocks/>
+            <a:stCxn id="42" idx="6"/>
+            <a:endCxn id="76" idx="2"/>
+          </p:cNvCxnSpPr>
           <p:nvPr/>
         </p:nvCxnSpPr>
         <p:spPr>
           <a:xfrm flipV="1">
-            <a:off x="1951600" y="3378439"/>
-            <a:ext cx="1097410" cy="1"/>
+            <a:off x="1853436" y="3331356"/>
+            <a:ext cx="1200982" cy="10225"/>
           </a:xfrm>
           <a:prstGeom prst="straightConnector1">
             <a:avLst/>
@@ -4605,8 +4561,8 @@
         </p:nvSpPr>
         <p:spPr>
           <a:xfrm rot="724471">
-            <a:off x="6944163" y="4811849"/>
-            <a:ext cx="881973" cy="338554"/>
+            <a:off x="6808740" y="4791068"/>
+            <a:ext cx="958525" cy="338554"/>
           </a:xfrm>
           <a:prstGeom prst="rect">
             <a:avLst/>
@@ -4614,7 +4570,7 @@
           <a:noFill/>
         </p:spPr>
         <p:txBody>
-          <a:bodyPr wrap="none" rtlCol="0">
+          <a:bodyPr wrap="square" rtlCol="0">
             <a:spAutoFit/>
           </a:bodyPr>
           <a:lstStyle/>
@@ -4648,8 +4604,8 @@
         </p:nvSpPr>
         <p:spPr>
           <a:xfrm>
-            <a:off x="8115823" y="3043127"/>
-            <a:ext cx="976549" cy="338554"/>
+            <a:off x="8075986" y="3043127"/>
+            <a:ext cx="1021424" cy="338554"/>
           </a:xfrm>
           <a:prstGeom prst="rect">
             <a:avLst/>
@@ -4657,7 +4613,7 @@
           <a:noFill/>
         </p:spPr>
         <p:txBody>
-          <a:bodyPr wrap="none" rtlCol="0">
+          <a:bodyPr wrap="square" rtlCol="0">
             <a:spAutoFit/>
           </a:bodyPr>
           <a:lstStyle/>
@@ -4665,15 +4621,7 @@
             <a:pPr algn="ctr"/>
             <a:r>
               <a:rPr lang="it-IT" sz="800" dirty="0"/>
-              <a:t>Click on ‘</a:t>
-            </a:r>
-            <a:r>
-              <a:rPr lang="it-IT" sz="800" dirty="0" err="1"/>
-              <a:t>Promote</a:t>
-            </a:r>
-            <a:r>
-              <a:rPr lang="it-IT" sz="800" dirty="0"/>
-              <a:t> </a:t>
+              <a:t>Click on ‘Promote </a:t>
             </a:r>
           </a:p>
           <a:p>
@@ -4699,8 +4647,8 @@
         </p:nvSpPr>
         <p:spPr>
           <a:xfrm>
-            <a:off x="2188078" y="3084293"/>
-            <a:ext cx="593432" cy="338554"/>
+            <a:off x="2089898" y="3034402"/>
+            <a:ext cx="668339" cy="338554"/>
           </a:xfrm>
           <a:prstGeom prst="rect">
             <a:avLst/>
@@ -4708,7 +4656,7 @@
           <a:noFill/>
         </p:spPr>
         <p:txBody>
-          <a:bodyPr wrap="none" rtlCol="0">
+          <a:bodyPr wrap="square" rtlCol="0">
             <a:spAutoFit/>
           </a:bodyPr>
           <a:lstStyle/>
@@ -4742,8 +4690,8 @@
         </p:nvSpPr>
         <p:spPr>
           <a:xfrm>
-            <a:off x="3054417" y="3058085"/>
-            <a:ext cx="2148793" cy="640707"/>
+            <a:off x="3054418" y="3058086"/>
+            <a:ext cx="2000008" cy="546540"/>
           </a:xfrm>
           <a:prstGeom prst="ellipse">
             <a:avLst/>
@@ -4779,28 +4727,12 @@
           <a:p>
             <a:pPr algn="ctr"/>
             <a:r>
-              <a:rPr lang="it-IT" sz="1600" dirty="0">
+              <a:rPr lang="it-IT" sz="1200" dirty="0">
                 <a:solidFill>
                   <a:schemeClr val="tx1"/>
                 </a:solidFill>
               </a:rPr>
-              <a:t>Browsing Group </a:t>
-            </a:r>
-            <a:r>
-              <a:rPr lang="it-IT" sz="1600" dirty="0" err="1">
-                <a:solidFill>
-                  <a:schemeClr val="tx1"/>
-                </a:solidFill>
-              </a:rPr>
-              <a:t>Overview</a:t>
-            </a:r>
-            <a:r>
-              <a:rPr lang="it-IT" sz="1600" dirty="0">
-                <a:solidFill>
-                  <a:schemeClr val="tx1"/>
-                </a:solidFill>
-              </a:rPr>
-              <a:t> </a:t>
+              <a:t>Browsing Group Overview </a:t>
             </a:r>
           </a:p>
         </p:txBody>
@@ -4819,8 +4751,8 @@
         </p:nvSpPr>
         <p:spPr>
           <a:xfrm>
-            <a:off x="3849205" y="4487797"/>
-            <a:ext cx="2246795" cy="640707"/>
+            <a:off x="3849206" y="4487798"/>
+            <a:ext cx="2091224" cy="546540"/>
           </a:xfrm>
           <a:prstGeom prst="ellipse">
             <a:avLst/>
@@ -4856,7 +4788,7 @@
           <a:p>
             <a:pPr algn="ctr"/>
             <a:r>
-              <a:rPr lang="it-IT" sz="1600" dirty="0">
+              <a:rPr lang="it-IT" sz="1200" dirty="0">
                 <a:solidFill>
                   <a:schemeClr val="tx1"/>
                 </a:solidFill>
@@ -4880,8 +4812,8 @@
         </p:nvSpPr>
         <p:spPr>
           <a:xfrm>
-            <a:off x="6335842" y="3054478"/>
-            <a:ext cx="1743466" cy="640707"/>
+            <a:off x="6335842" y="3054479"/>
+            <a:ext cx="1622746" cy="546540"/>
           </a:xfrm>
           <a:prstGeom prst="ellipse">
             <a:avLst/>
@@ -4917,20 +4849,12 @@
           <a:p>
             <a:pPr algn="ctr"/>
             <a:r>
-              <a:rPr lang="it-IT" sz="1600" dirty="0" err="1">
+              <a:rPr lang="it-IT" sz="1200" dirty="0">
                 <a:solidFill>
                   <a:schemeClr val="tx1"/>
                 </a:solidFill>
               </a:rPr>
-              <a:t>Contact</a:t>
-            </a:r>
-            <a:r>
-              <a:rPr lang="it-IT" sz="1600" dirty="0">
-                <a:solidFill>
-                  <a:schemeClr val="tx1"/>
-                </a:solidFill>
-              </a:rPr>
-              <a:t> settings</a:t>
+              <a:t>Contact settings</a:t>
             </a:r>
           </a:p>
         </p:txBody>
@@ -4946,14 +4870,15 @@
           </p:cNvPr>
           <p:cNvCxnSpPr>
             <a:cxnSpLocks/>
+            <a:stCxn id="90" idx="6"/>
             <a:endCxn id="77" idx="2"/>
           </p:cNvCxnSpPr>
           <p:nvPr/>
         </p:nvCxnSpPr>
         <p:spPr>
           <a:xfrm>
-            <a:off x="2317127" y="4804574"/>
-            <a:ext cx="1532078" cy="3577"/>
+            <a:off x="2168343" y="4758862"/>
+            <a:ext cx="1680863" cy="2206"/>
           </a:xfrm>
           <a:prstGeom prst="straightConnector1">
             <a:avLst/>
@@ -4989,13 +4914,17 @@
               </a:ext>
             </a:extLst>
           </p:cNvPr>
-          <p:cNvCxnSpPr/>
+          <p:cNvCxnSpPr>
+            <a:cxnSpLocks/>
+            <a:stCxn id="78" idx="6"/>
+            <a:endCxn id="45" idx="2"/>
+          </p:cNvCxnSpPr>
           <p:nvPr/>
         </p:nvCxnSpPr>
         <p:spPr>
-          <a:xfrm flipV="1">
-            <a:off x="8079308" y="3372956"/>
-            <a:ext cx="1097410" cy="1"/>
+          <a:xfrm>
+            <a:off x="7958588" y="3327749"/>
+            <a:ext cx="1218130" cy="3607"/>
           </a:xfrm>
           <a:prstGeom prst="straightConnector1">
             <a:avLst/>
@@ -5033,13 +4962,15 @@
           </p:cNvPr>
           <p:cNvCxnSpPr>
             <a:cxnSpLocks/>
+            <a:stCxn id="76" idx="6"/>
+            <a:endCxn id="78" idx="2"/>
           </p:cNvCxnSpPr>
           <p:nvPr/>
         </p:nvCxnSpPr>
         <p:spPr>
           <a:xfrm flipV="1">
-            <a:off x="5208615" y="3378438"/>
-            <a:ext cx="1121822" cy="2"/>
+            <a:off x="5054426" y="3327749"/>
+            <a:ext cx="1281416" cy="3607"/>
           </a:xfrm>
           <a:prstGeom prst="straightConnector1">
             <a:avLst/>
@@ -5080,112 +5011,8 @@
         </p:nvSpPr>
         <p:spPr>
           <a:xfrm>
-            <a:off x="5193886" y="3039884"/>
-            <a:ext cx="1079143" cy="338554"/>
-          </a:xfrm>
-          <a:prstGeom prst="rect">
-            <a:avLst/>
-          </a:prstGeom>
-          <a:noFill/>
-        </p:spPr>
-        <p:txBody>
-          <a:bodyPr wrap="none" rtlCol="0">
-            <a:spAutoFit/>
-          </a:bodyPr>
-          <a:lstStyle/>
-          <a:p>
-            <a:pPr algn="ctr"/>
-            <a:r>
-              <a:rPr lang="it-IT" sz="800" dirty="0"/>
-              <a:t>Press for a bit</a:t>
-            </a:r>
-          </a:p>
-          <a:p>
-            <a:pPr algn="ctr"/>
-            <a:r>
-              <a:rPr lang="it-IT" sz="800" dirty="0"/>
-              <a:t>on </a:t>
-            </a:r>
-            <a:r>
-              <a:rPr lang="it-IT" sz="800" dirty="0" err="1"/>
-              <a:t>ColligoBot</a:t>
-            </a:r>
-            <a:r>
-              <a:rPr lang="it-IT" sz="800" dirty="0"/>
-              <a:t> </a:t>
-            </a:r>
-            <a:r>
-              <a:rPr lang="it-IT" sz="800" dirty="0" err="1"/>
-              <a:t>contact</a:t>
-            </a:r>
-            <a:endParaRPr lang="it-IT" sz="800" dirty="0"/>
-          </a:p>
-        </p:txBody>
-      </p:sp>
-      <p:sp>
-        <p:nvSpPr>
-          <p:cNvPr id="88" name="CasellaDiTesto 87">
-            <a:extLst>
-              <a:ext uri="{FF2B5EF4-FFF2-40B4-BE49-F238E27FC236}">
-                <a16:creationId xmlns:a16="http://schemas.microsoft.com/office/drawing/2014/main" id="{D921F11F-9124-4538-82AB-06027F24A13C}"/>
-              </a:ext>
-            </a:extLst>
-          </p:cNvPr>
-          <p:cNvSpPr txBox="1"/>
-          <p:nvPr/>
-        </p:nvSpPr>
-        <p:spPr>
-          <a:xfrm rot="20146058">
-            <a:off x="1988507" y="3694209"/>
-            <a:ext cx="739305" cy="338554"/>
-          </a:xfrm>
-          <a:prstGeom prst="rect">
-            <a:avLst/>
-          </a:prstGeom>
-          <a:noFill/>
-        </p:spPr>
-        <p:txBody>
-          <a:bodyPr wrap="none" rtlCol="0">
-            <a:spAutoFit/>
-          </a:bodyPr>
-          <a:lstStyle/>
-          <a:p>
-            <a:pPr algn="ctr"/>
-            <a:r>
-              <a:rPr lang="it-IT" sz="800" dirty="0"/>
-              <a:t>Press the</a:t>
-            </a:r>
-          </a:p>
-          <a:p>
-            <a:pPr algn="ctr"/>
-            <a:r>
-              <a:rPr lang="it-IT" sz="800" dirty="0"/>
-              <a:t>‘Back’ </a:t>
-            </a:r>
-            <a:r>
-              <a:rPr lang="it-IT" sz="800" dirty="0" err="1"/>
-              <a:t>button</a:t>
-            </a:r>
-            <a:endParaRPr lang="it-IT" sz="800" dirty="0"/>
-          </a:p>
-        </p:txBody>
-      </p:sp>
-      <p:sp>
-        <p:nvSpPr>
-          <p:cNvPr id="89" name="CasellaDiTesto 88">
-            <a:extLst>
-              <a:ext uri="{FF2B5EF4-FFF2-40B4-BE49-F238E27FC236}">
-                <a16:creationId xmlns:a16="http://schemas.microsoft.com/office/drawing/2014/main" id="{45902804-D90B-42DA-84AA-CBFD3C80770E}"/>
-              </a:ext>
-            </a:extLst>
-          </p:cNvPr>
-          <p:cNvSpPr txBox="1"/>
-          <p:nvPr/>
-        </p:nvSpPr>
-        <p:spPr>
-          <a:xfrm>
-            <a:off x="6231708" y="3863486"/>
-            <a:ext cx="1226619" cy="215444"/>
+            <a:off x="5140899" y="3031746"/>
+            <a:ext cx="1077545" cy="338554"/>
           </a:xfrm>
           <a:prstGeom prst="rect">
             <a:avLst/>
@@ -5201,15 +5028,93 @@
             <a:pPr algn="ctr"/>
             <a:r>
               <a:rPr lang="it-IT" sz="800" dirty="0"/>
-              <a:t>Click on ‘</a:t>
-            </a:r>
-            <a:r>
-              <a:rPr lang="it-IT" sz="800" dirty="0" err="1"/>
-              <a:t>Confirm</a:t>
-            </a:r>
+              <a:t>Press for a bit</a:t>
+            </a:r>
+          </a:p>
+          <a:p>
+            <a:pPr algn="ctr"/>
             <a:r>
               <a:rPr lang="it-IT" sz="800" dirty="0"/>
-              <a:t>’ botton</a:t>
+              <a:t>on ColligoBot contact</a:t>
+            </a:r>
+          </a:p>
+        </p:txBody>
+      </p:sp>
+      <p:sp>
+        <p:nvSpPr>
+          <p:cNvPr id="88" name="CasellaDiTesto 87">
+            <a:extLst>
+              <a:ext uri="{FF2B5EF4-FFF2-40B4-BE49-F238E27FC236}">
+                <a16:creationId xmlns:a16="http://schemas.microsoft.com/office/drawing/2014/main" id="{D921F11F-9124-4538-82AB-06027F24A13C}"/>
+              </a:ext>
+            </a:extLst>
+          </p:cNvPr>
+          <p:cNvSpPr txBox="1"/>
+          <p:nvPr/>
+        </p:nvSpPr>
+        <p:spPr>
+          <a:xfrm rot="20146058">
+            <a:off x="1884152" y="3691480"/>
+            <a:ext cx="790673" cy="338554"/>
+          </a:xfrm>
+          <a:prstGeom prst="rect">
+            <a:avLst/>
+          </a:prstGeom>
+          <a:noFill/>
+        </p:spPr>
+        <p:txBody>
+          <a:bodyPr wrap="square" rtlCol="0">
+            <a:spAutoFit/>
+          </a:bodyPr>
+          <a:lstStyle/>
+          <a:p>
+            <a:pPr algn="ctr"/>
+            <a:r>
+              <a:rPr lang="it-IT" sz="800" dirty="0"/>
+              <a:t>Press the</a:t>
+            </a:r>
+          </a:p>
+          <a:p>
+            <a:pPr algn="ctr"/>
+            <a:r>
+              <a:rPr lang="it-IT" sz="800" dirty="0"/>
+              <a:t>‘Back’ button</a:t>
+            </a:r>
+          </a:p>
+        </p:txBody>
+      </p:sp>
+      <p:sp>
+        <p:nvSpPr>
+          <p:cNvPr id="89" name="CasellaDiTesto 88">
+            <a:extLst>
+              <a:ext uri="{FF2B5EF4-FFF2-40B4-BE49-F238E27FC236}">
+                <a16:creationId xmlns:a16="http://schemas.microsoft.com/office/drawing/2014/main" id="{45902804-D90B-42DA-84AA-CBFD3C80770E}"/>
+              </a:ext>
+            </a:extLst>
+          </p:cNvPr>
+          <p:cNvSpPr txBox="1"/>
+          <p:nvPr/>
+        </p:nvSpPr>
+        <p:spPr>
+          <a:xfrm>
+            <a:off x="6231709" y="3863486"/>
+            <a:ext cx="1141686" cy="338554"/>
+          </a:xfrm>
+          <a:prstGeom prst="rect">
+            <a:avLst/>
+          </a:prstGeom>
+          <a:noFill/>
+        </p:spPr>
+        <p:txBody>
+          <a:bodyPr wrap="square" rtlCol="0">
+            <a:spAutoFit/>
+          </a:bodyPr>
+          <a:lstStyle/>
+          <a:p>
+            <a:pPr algn="ctr"/>
+            <a:r>
+              <a:rPr lang="it-IT" sz="800" dirty="0"/>
+              <a:t>Click on ‘Confirm’ botton</a:t>
             </a:r>
           </a:p>
         </p:txBody>
@@ -5228,8 +5133,8 @@
         </p:nvSpPr>
         <p:spPr>
           <a:xfrm>
-            <a:off x="168334" y="4472790"/>
-            <a:ext cx="2148793" cy="670721"/>
+            <a:off x="168335" y="4472790"/>
+            <a:ext cx="2000008" cy="572143"/>
           </a:xfrm>
           <a:prstGeom prst="ellipse">
             <a:avLst/>
@@ -5265,7 +5170,7 @@
           <a:p>
             <a:pPr algn="ctr"/>
             <a:r>
-              <a:rPr lang="it-IT" sz="1600" dirty="0">
+              <a:rPr lang="it-IT" sz="1200" dirty="0">
                 <a:solidFill>
                   <a:schemeClr val="tx1"/>
                 </a:solidFill>
@@ -5291,13 +5196,13 @@
           <p:nvPr/>
         </p:nvCxnSpPr>
         <p:spPr>
-          <a:xfrm rot="5400000" flipH="1">
-            <a:off x="7080111" y="747495"/>
-            <a:ext cx="24533" cy="5927128"/>
+          <a:xfrm rot="5400000">
+            <a:off x="7024743" y="634305"/>
+            <a:ext cx="12700" cy="5940642"/>
           </a:xfrm>
           <a:prstGeom prst="curvedConnector3">
             <a:avLst>
-              <a:gd name="adj1" fmla="val -1342151"/>
+              <a:gd name="adj1" fmla="val 1800000"/>
             </a:avLst>
           </a:prstGeom>
           <a:ln>
@@ -5340,8 +5245,8 @@
         </p:nvCxnSpPr>
         <p:spPr>
           <a:xfrm flipH="1">
-            <a:off x="1242731" y="3604963"/>
-            <a:ext cx="2126369" cy="867827"/>
+            <a:off x="1168339" y="3524587"/>
+            <a:ext cx="2178973" cy="948203"/>
           </a:xfrm>
           <a:prstGeom prst="straightConnector1">
             <a:avLst/>
@@ -5383,7 +5288,7 @@
         <p:spPr>
           <a:xfrm>
             <a:off x="3924714" y="5139933"/>
-            <a:ext cx="880370" cy="338554"/>
+            <a:ext cx="819412" cy="461665"/>
           </a:xfrm>
           <a:prstGeom prst="rect">
             <a:avLst/>
@@ -5391,7 +5296,7 @@
           <a:noFill/>
         </p:spPr>
         <p:txBody>
-          <a:bodyPr wrap="none" rtlCol="0">
+          <a:bodyPr wrap="square" rtlCol="0">
             <a:spAutoFit/>
           </a:bodyPr>
           <a:lstStyle/>
@@ -5406,15 +5311,7 @@
             <a:pPr algn="ctr"/>
             <a:r>
               <a:rPr lang="it-IT" sz="800" dirty="0"/>
-              <a:t>‘</a:t>
-            </a:r>
-            <a:r>
-              <a:rPr lang="it-IT" sz="800" dirty="0" err="1"/>
-              <a:t>Confirm</a:t>
-            </a:r>
-            <a:r>
-              <a:rPr lang="it-IT" sz="800" dirty="0"/>
-              <a:t>’ botton</a:t>
+              <a:t>‘Confirm’ botton</a:t>
             </a:r>
           </a:p>
         </p:txBody>
@@ -5433,8 +5330,8 @@
         </p:nvSpPr>
         <p:spPr>
           <a:xfrm>
-            <a:off x="2714737" y="4439926"/>
-            <a:ext cx="676787" cy="338554"/>
+            <a:off x="2606039" y="4439926"/>
+            <a:ext cx="849964" cy="338554"/>
           </a:xfrm>
           <a:prstGeom prst="rect">
             <a:avLst/>
@@ -5442,7 +5339,7 @@
           <a:noFill/>
         </p:spPr>
         <p:txBody>
-          <a:bodyPr wrap="none" rtlCol="0">
+          <a:bodyPr wrap="square" rtlCol="0">
             <a:spAutoFit/>
           </a:bodyPr>
           <a:lstStyle/>
@@ -5476,8 +5373,8 @@
         </p:nvSpPr>
         <p:spPr>
           <a:xfrm>
-            <a:off x="6165908" y="5917509"/>
-            <a:ext cx="1216404" cy="640707"/>
+            <a:off x="6165908" y="5917510"/>
+            <a:ext cx="1132179" cy="546540"/>
           </a:xfrm>
           <a:prstGeom prst="ellipse">
             <a:avLst/>
@@ -5534,8 +5431,8 @@
         </p:nvSpPr>
         <p:spPr>
           <a:xfrm>
-            <a:off x="8249000" y="4141420"/>
-            <a:ext cx="1417741" cy="640707"/>
+            <a:off x="8249000" y="4141421"/>
+            <a:ext cx="1319575" cy="546540"/>
           </a:xfrm>
           <a:prstGeom prst="ellipse">
             <a:avLst/>
@@ -5571,20 +5468,12 @@
           <a:p>
             <a:pPr algn="ctr"/>
             <a:r>
-              <a:rPr lang="it-IT" sz="1600" dirty="0" err="1">
+              <a:rPr lang="it-IT" sz="1200" dirty="0">
                 <a:solidFill>
                   <a:schemeClr val="tx1"/>
                 </a:solidFill>
               </a:rPr>
-              <a:t>Contacts</a:t>
-            </a:r>
-            <a:r>
-              <a:rPr lang="it-IT" sz="1600" dirty="0">
-                <a:solidFill>
-                  <a:schemeClr val="tx1"/>
-                </a:solidFill>
-              </a:rPr>
-              <a:t> list</a:t>
+              <a:t>Categories list</a:t>
             </a:r>
           </a:p>
         </p:txBody>
@@ -5603,8 +5492,8 @@
         </p:nvSpPr>
         <p:spPr>
           <a:xfrm>
-            <a:off x="3265825" y="5510311"/>
-            <a:ext cx="1417741" cy="640707"/>
+            <a:off x="3265825" y="5510312"/>
+            <a:ext cx="1319575" cy="546540"/>
           </a:xfrm>
           <a:prstGeom prst="ellipse">
             <a:avLst/>
@@ -5640,20 +5529,12 @@
           <a:p>
             <a:pPr algn="ctr"/>
             <a:r>
-              <a:rPr lang="it-IT" sz="1600" dirty="0" err="1">
+              <a:rPr lang="it-IT" sz="1200" dirty="0">
                 <a:solidFill>
                   <a:schemeClr val="tx1"/>
                 </a:solidFill>
               </a:rPr>
-              <a:t>Address</a:t>
-            </a:r>
-            <a:r>
-              <a:rPr lang="it-IT" sz="1600" dirty="0">
-                <a:solidFill>
-                  <a:schemeClr val="tx1"/>
-                </a:solidFill>
-              </a:rPr>
-              <a:t> site</a:t>
+              <a:t>Address site</a:t>
             </a:r>
           </a:p>
         </p:txBody>
@@ -5672,8 +5553,8 @@
         </p:nvSpPr>
         <p:spPr>
           <a:xfrm rot="1044810">
-            <a:off x="2055694" y="5236563"/>
-            <a:ext cx="697627" cy="338554"/>
+            <a:off x="1995576" y="5181345"/>
+            <a:ext cx="842226" cy="338554"/>
           </a:xfrm>
           <a:prstGeom prst="rect">
             <a:avLst/>
@@ -5681,7 +5562,7 @@
           <a:noFill/>
         </p:spPr>
         <p:txBody>
-          <a:bodyPr wrap="none" rtlCol="0">
+          <a:bodyPr wrap="square" rtlCol="0">
             <a:spAutoFit/>
           </a:bodyPr>
           <a:lstStyle/>
@@ -5719,8 +5600,8 @@
         </p:nvCxnSpPr>
         <p:spPr>
           <a:xfrm>
-            <a:off x="6096000" y="4808151"/>
-            <a:ext cx="2102152" cy="501059"/>
+            <a:off x="5940430" y="4761068"/>
+            <a:ext cx="2257722" cy="501059"/>
           </a:xfrm>
           <a:prstGeom prst="straightConnector1">
             <a:avLst/>
@@ -5765,8 +5646,8 @@
         </p:nvCxnSpPr>
         <p:spPr>
           <a:xfrm flipV="1">
-            <a:off x="6096000" y="4461774"/>
-            <a:ext cx="2153000" cy="346377"/>
+            <a:off x="5940430" y="4414691"/>
+            <a:ext cx="2308570" cy="346377"/>
           </a:xfrm>
           <a:prstGeom prst="straightConnector1">
             <a:avLst/>
@@ -5811,8 +5692,8 @@
         </p:nvCxnSpPr>
         <p:spPr>
           <a:xfrm flipV="1">
-            <a:off x="3974696" y="5034675"/>
-            <a:ext cx="203545" cy="475636"/>
+            <a:off x="3925613" y="4954299"/>
+            <a:ext cx="229846" cy="556013"/>
           </a:xfrm>
           <a:prstGeom prst="straightConnector1">
             <a:avLst/>
@@ -5853,8 +5734,8 @@
         </p:nvSpPr>
         <p:spPr>
           <a:xfrm rot="20980769">
-            <a:off x="6765872" y="4318520"/>
-            <a:ext cx="986167" cy="338554"/>
+            <a:off x="6632246" y="4284681"/>
+            <a:ext cx="1029938" cy="338554"/>
           </a:xfrm>
           <a:prstGeom prst="rect">
             <a:avLst/>
@@ -5862,7 +5743,7 @@
           <a:noFill/>
         </p:spPr>
         <p:txBody>
-          <a:bodyPr wrap="none" rtlCol="0">
+          <a:bodyPr wrap="square" rtlCol="0">
             <a:spAutoFit/>
           </a:bodyPr>
           <a:lstStyle/>
@@ -5877,15 +5758,7 @@
             <a:pPr algn="ctr"/>
             <a:r>
               <a:rPr lang="it-IT" sz="800" dirty="0"/>
-              <a:t>‘</a:t>
-            </a:r>
-            <a:r>
-              <a:rPr lang="it-IT" sz="800" dirty="0" err="1"/>
-              <a:t>Categories</a:t>
-            </a:r>
-            <a:r>
-              <a:rPr lang="it-IT" sz="800" dirty="0"/>
-              <a:t>’ botton</a:t>
+              <a:t>‘Categories’ botton</a:t>
             </a:r>
           </a:p>
         </p:txBody>
@@ -5904,8 +5777,8 @@
         </p:nvSpPr>
         <p:spPr>
           <a:xfrm>
-            <a:off x="9807310" y="4354051"/>
-            <a:ext cx="513281" cy="215444"/>
+            <a:off x="9505381" y="4259172"/>
+            <a:ext cx="477741" cy="338554"/>
           </a:xfrm>
           <a:prstGeom prst="rect">
             <a:avLst/>
@@ -5913,19 +5786,15 @@
           <a:noFill/>
         </p:spPr>
         <p:txBody>
-          <a:bodyPr wrap="none" rtlCol="0">
+          <a:bodyPr wrap="square" rtlCol="0">
             <a:spAutoFit/>
           </a:bodyPr>
           <a:lstStyle/>
           <a:p>
             <a:pPr algn="ctr"/>
             <a:r>
-              <a:rPr lang="it-IT" sz="800" dirty="0" err="1"/>
-              <a:t>Fill</a:t>
-            </a:r>
-            <a:r>
               <a:rPr lang="it-IT" sz="800" dirty="0"/>
-              <a:t> data</a:t>
+              <a:t>Fill data</a:t>
             </a:r>
           </a:p>
         </p:txBody>
@@ -5944,8 +5813,8 @@
         </p:nvSpPr>
         <p:spPr>
           <a:xfrm>
-            <a:off x="9853981" y="5213666"/>
-            <a:ext cx="513281" cy="215444"/>
+            <a:off x="9505382" y="5100093"/>
+            <a:ext cx="477741" cy="338554"/>
           </a:xfrm>
           <a:prstGeom prst="rect">
             <a:avLst/>
@@ -5953,19 +5822,15 @@
           <a:noFill/>
         </p:spPr>
         <p:txBody>
-          <a:bodyPr wrap="none" rtlCol="0">
+          <a:bodyPr wrap="square" rtlCol="0">
             <a:spAutoFit/>
           </a:bodyPr>
           <a:lstStyle/>
           <a:p>
             <a:pPr algn="ctr"/>
             <a:r>
-              <a:rPr lang="it-IT" sz="800" dirty="0" err="1"/>
-              <a:t>Fill</a:t>
-            </a:r>
-            <a:r>
               <a:rPr lang="it-IT" sz="800" dirty="0"/>
-              <a:t> data</a:t>
+              <a:t>Fill data</a:t>
             </a:r>
           </a:p>
         </p:txBody>
@@ -5988,14 +5853,14 @@
         </p:nvCxnSpPr>
         <p:spPr>
           <a:xfrm rot="16200000" flipH="1">
-            <a:off x="9232593" y="4461773"/>
-            <a:ext cx="453049" cy="12700"/>
+            <a:off x="9182097" y="4414691"/>
+            <a:ext cx="386462" cy="12700"/>
           </a:xfrm>
           <a:prstGeom prst="curvedConnector5">
             <a:avLst>
-              <a:gd name="adj1" fmla="val -13424"/>
-              <a:gd name="adj2" fmla="val 7431244"/>
-              <a:gd name="adj3" fmla="val 111572"/>
+              <a:gd name="adj1" fmla="val -24422"/>
+              <a:gd name="adj2" fmla="val 5054047"/>
+              <a:gd name="adj3" fmla="val 117908"/>
             </a:avLst>
           </a:prstGeom>
           <a:ln>
@@ -6031,19 +5896,21 @@
           </p:cNvPr>
           <p:cNvCxnSpPr>
             <a:cxnSpLocks/>
+            <a:stCxn id="43" idx="7"/>
+            <a:endCxn id="43" idx="5"/>
           </p:cNvCxnSpPr>
           <p:nvPr/>
         </p:nvCxnSpPr>
         <p:spPr>
           <a:xfrm rot="16200000" flipH="1">
-            <a:off x="9245293" y="5302859"/>
-            <a:ext cx="453049" cy="12700"/>
+            <a:off x="9131249" y="5262127"/>
+            <a:ext cx="386462" cy="12700"/>
           </a:xfrm>
           <a:prstGeom prst="curvedConnector5">
             <a:avLst>
-              <a:gd name="adj1" fmla="val -13424"/>
-              <a:gd name="adj2" fmla="val 7431244"/>
-              <a:gd name="adj3" fmla="val 111572"/>
+              <a:gd name="adj1" fmla="val -26591"/>
+              <a:gd name="adj2" fmla="val 5780654"/>
+              <a:gd name="adj3" fmla="val 111396"/>
             </a:avLst>
           </a:prstGeom>
           <a:ln>
@@ -6082,8 +5949,8 @@
         </p:nvSpPr>
         <p:spPr>
           <a:xfrm>
-            <a:off x="6231709" y="5973608"/>
-            <a:ext cx="1075102" cy="528507"/>
+            <a:off x="6231709" y="5973609"/>
+            <a:ext cx="1000661" cy="450830"/>
           </a:xfrm>
           <a:prstGeom prst="ellipse">
             <a:avLst/>
@@ -6119,13 +5986,18 @@
           <a:p>
             <a:pPr algn="ctr"/>
             <a:r>
-              <a:rPr lang="it-IT" dirty="0">
+              <a:rPr lang="it-IT" sz="1400" b="1" dirty="0">
                 <a:solidFill>
                   <a:schemeClr val="tx1"/>
                 </a:solidFill>
               </a:rPr>
               <a:t>Finish</a:t>
             </a:r>
+            <a:endParaRPr lang="it-IT" b="1" dirty="0">
+              <a:solidFill>
+                <a:schemeClr val="tx1"/>
+              </a:solidFill>
+            </a:endParaRPr>
           </a:p>
         </p:txBody>
       </p:sp>
@@ -6189,23 +6061,7 @@
           <a:p>
             <a:r>
               <a:rPr lang="it-IT" sz="4000" dirty="0"/>
-              <a:t>STN Operator: </a:t>
-            </a:r>
-            <a:r>
-              <a:rPr lang="it-IT" sz="4000" dirty="0" err="1"/>
-              <a:t>Fill</a:t>
-            </a:r>
-            <a:r>
-              <a:rPr lang="it-IT" sz="4000" dirty="0"/>
-              <a:t> </a:t>
-            </a:r>
-            <a:r>
-              <a:rPr lang="it-IT" sz="4000" dirty="0" err="1"/>
-              <a:t>daily</a:t>
-            </a:r>
-            <a:r>
-              <a:rPr lang="it-IT" sz="4000" dirty="0"/>
-              <a:t> window shop</a:t>
+              <a:t>STN Operator: Fill daily window shop</a:t>
             </a:r>
           </a:p>
         </p:txBody>
@@ -6225,7 +6081,7 @@
         <p:spPr>
           <a:xfrm>
             <a:off x="10391314" y="2780548"/>
-            <a:ext cx="1031699" cy="457986"/>
+            <a:ext cx="1031699" cy="545554"/>
           </a:xfrm>
           <a:prstGeom prst="ellipse">
             <a:avLst/>
@@ -6274,7 +6130,7 @@
         <p:spPr>
           <a:xfrm>
             <a:off x="2361499" y="2771278"/>
-            <a:ext cx="1627235" cy="418151"/>
+            <a:ext cx="1627235" cy="498102"/>
           </a:xfrm>
           <a:prstGeom prst="ellipse">
             <a:avLst/>
@@ -6315,23 +6171,7 @@
                   <a:schemeClr val="tx1"/>
                 </a:solidFill>
               </a:rPr>
-              <a:t>Browsing the </a:t>
-            </a:r>
-            <a:r>
-              <a:rPr lang="it-IT" sz="1200" dirty="0" err="1">
-                <a:solidFill>
-                  <a:schemeClr val="tx1"/>
-                </a:solidFill>
-              </a:rPr>
-              <a:t>categories</a:t>
-            </a:r>
-            <a:r>
-              <a:rPr lang="it-IT" sz="1200" dirty="0">
-                <a:solidFill>
-                  <a:schemeClr val="tx1"/>
-                </a:solidFill>
-              </a:rPr>
-              <a:t> list</a:t>
+              <a:t>Browsing the categories list</a:t>
             </a:r>
           </a:p>
         </p:txBody>
@@ -6351,7 +6191,7 @@
         <p:spPr>
           <a:xfrm>
             <a:off x="256454" y="2756827"/>
-            <a:ext cx="894629" cy="418151"/>
+            <a:ext cx="894629" cy="498102"/>
           </a:xfrm>
           <a:prstGeom prst="ellipse">
             <a:avLst/>
@@ -6405,7 +6245,7 @@
         <p:spPr>
           <a:xfrm>
             <a:off x="312782" y="2793440"/>
-            <a:ext cx="781972" cy="344924"/>
+            <a:ext cx="781972" cy="410874"/>
           </a:xfrm>
           <a:prstGeom prst="ellipse">
             <a:avLst/>
@@ -6441,13 +6281,18 @@
           <a:p>
             <a:pPr algn="ctr"/>
             <a:r>
-              <a:rPr lang="it-IT" sz="1200" dirty="0">
+              <a:rPr lang="it-IT" sz="1400" b="1" dirty="0">
                 <a:solidFill>
                   <a:schemeClr val="tx1"/>
                 </a:solidFill>
               </a:rPr>
               <a:t>Start</a:t>
             </a:r>
+            <a:endParaRPr lang="it-IT" sz="1200" b="1" dirty="0">
+              <a:solidFill>
+                <a:schemeClr val="tx1"/>
+              </a:solidFill>
+            </a:endParaRPr>
           </a:p>
         </p:txBody>
       </p:sp>
@@ -6482,28 +6327,15 @@
             <a:pPr algn="ctr"/>
             <a:r>
               <a:rPr lang="it-IT" sz="800" dirty="0"/>
-              <a:t>Press the ‘</a:t>
-            </a:r>
-            <a:r>
-              <a:rPr lang="it-IT" sz="800" dirty="0" err="1"/>
-              <a:t>Fill</a:t>
-            </a:r>
+              <a:t>Press the ‘Fill the window</a:t>
+            </a:r>
+          </a:p>
+          <a:p>
+            <a:pPr algn="ctr"/>
             <a:r>
               <a:rPr lang="it-IT" sz="800" dirty="0"/>
-              <a:t> the window</a:t>
-            </a:r>
-          </a:p>
-          <a:p>
-            <a:pPr algn="ctr"/>
-            <a:r>
-              <a:rPr lang="it-IT" sz="800" dirty="0"/>
-              <a:t>Shop’ </a:t>
-            </a:r>
-            <a:r>
-              <a:rPr lang="it-IT" sz="800" dirty="0" err="1"/>
-              <a:t>button</a:t>
-            </a:r>
-            <a:endParaRPr lang="it-IT" sz="800" dirty="0"/>
+              <a:t>Shop’ button</a:t>
+            </a:r>
           </a:p>
         </p:txBody>
       </p:sp>
@@ -6522,7 +6354,7 @@
         <p:spPr>
           <a:xfrm>
             <a:off x="2339744" y="1422316"/>
-            <a:ext cx="1648990" cy="418151"/>
+            <a:ext cx="1648990" cy="498102"/>
           </a:xfrm>
           <a:prstGeom prst="ellipse">
             <a:avLst/>
@@ -6563,23 +6395,7 @@
                   <a:schemeClr val="tx1"/>
                 </a:solidFill>
               </a:rPr>
-              <a:t>Browsing the </a:t>
-            </a:r>
-            <a:r>
-              <a:rPr lang="it-IT" sz="1200" dirty="0" err="1">
-                <a:solidFill>
-                  <a:schemeClr val="tx1"/>
-                </a:solidFill>
-              </a:rPr>
-              <a:t>foodstuffs</a:t>
-            </a:r>
-            <a:r>
-              <a:rPr lang="it-IT" sz="1200" dirty="0">
-                <a:solidFill>
-                  <a:schemeClr val="tx1"/>
-                </a:solidFill>
-              </a:rPr>
-              <a:t> list</a:t>
+              <a:t>Browsing the foodstuffs list</a:t>
             </a:r>
           </a:p>
         </p:txBody>
@@ -6615,32 +6431,23 @@
             <a:pPr algn="ctr"/>
             <a:r>
               <a:rPr lang="it-IT" sz="800" dirty="0"/>
-              <a:t>Press the ’</a:t>
+              <a:t>Press the </a:t>
             </a:r>
             <a:r>
               <a:rPr lang="it-IT" sz="800" dirty="0" err="1"/>
-              <a:t>Category</a:t>
-            </a:r>
-            <a:r>
-              <a:rPr lang="it-IT" sz="800" dirty="0"/>
-              <a:t>’ </a:t>
-            </a:r>
-          </a:p>
-          <a:p>
-            <a:pPr algn="ctr"/>
-            <a:r>
-              <a:rPr lang="it-IT" sz="800" dirty="0" err="1"/>
-              <a:t>choosen</a:t>
+              <a:t>category</a:t>
             </a:r>
             <a:r>
               <a:rPr lang="it-IT" sz="800" dirty="0"/>
               <a:t> </a:t>
             </a:r>
-            <a:r>
-              <a:rPr lang="it-IT" sz="800" dirty="0" err="1"/>
-              <a:t>button</a:t>
-            </a:r>
-            <a:endParaRPr lang="it-IT" sz="800" dirty="0"/>
+          </a:p>
+          <a:p>
+            <a:pPr algn="ctr"/>
+            <a:r>
+              <a:rPr lang="it-IT" sz="800" dirty="0"/>
+              <a:t>choosen button</a:t>
+            </a:r>
           </a:p>
         </p:txBody>
       </p:sp>
@@ -6659,7 +6466,7 @@
         <p:spPr>
           <a:xfrm>
             <a:off x="5937988" y="1450531"/>
-            <a:ext cx="1761355" cy="418151"/>
+            <a:ext cx="1761355" cy="498102"/>
           </a:xfrm>
           <a:prstGeom prst="ellipse">
             <a:avLst/>
@@ -6700,23 +6507,7 @@
                   <a:schemeClr val="tx1"/>
                 </a:solidFill>
               </a:rPr>
-              <a:t>Write the </a:t>
-            </a:r>
-            <a:r>
-              <a:rPr lang="it-IT" sz="1200" dirty="0" err="1">
-                <a:solidFill>
-                  <a:schemeClr val="tx1"/>
-                </a:solidFill>
-              </a:rPr>
-              <a:t>foodstuff</a:t>
-            </a:r>
-            <a:r>
-              <a:rPr lang="it-IT" sz="1200" dirty="0">
-                <a:solidFill>
-                  <a:schemeClr val="tx1"/>
-                </a:solidFill>
-              </a:rPr>
-              <a:t> price</a:t>
+              <a:t>Write the foodstuff price</a:t>
             </a:r>
           </a:p>
         </p:txBody>
@@ -6752,24 +6543,15 @@
             <a:pPr algn="ctr"/>
             <a:r>
               <a:rPr lang="it-IT" sz="800" dirty="0"/>
-              <a:t>Press the ‘</a:t>
-            </a:r>
-            <a:r>
-              <a:rPr lang="it-IT" sz="800" dirty="0" err="1"/>
-              <a:t>Foodtuff</a:t>
-            </a:r>
+              <a:t>Press the ‘Foodtuff’ </a:t>
+            </a:r>
+          </a:p>
+          <a:p>
+            <a:pPr algn="ctr"/>
             <a:r>
               <a:rPr lang="it-IT" sz="800" dirty="0"/>
-              <a:t>’ </a:t>
-            </a:r>
-          </a:p>
-          <a:p>
-            <a:pPr algn="ctr"/>
-            <a:r>
-              <a:rPr lang="it-IT" sz="800" dirty="0" err="1"/>
               <a:t>button</a:t>
             </a:r>
-            <a:endParaRPr lang="it-IT" sz="800" dirty="0"/>
           </a:p>
         </p:txBody>
       </p:sp>
@@ -6787,7 +6569,7 @@
         </p:nvSpPr>
         <p:spPr>
           <a:xfrm>
-            <a:off x="4711472" y="1770348"/>
+            <a:off x="4731193" y="1830047"/>
             <a:ext cx="877163" cy="338554"/>
           </a:xfrm>
           <a:prstGeom prst="rect">
@@ -6804,32 +6586,15 @@
             <a:pPr algn="ctr"/>
             <a:r>
               <a:rPr lang="it-IT" sz="800" dirty="0"/>
-              <a:t>Press the ‘</a:t>
-            </a:r>
-            <a:r>
-              <a:rPr lang="it-IT" sz="800" dirty="0" err="1"/>
-              <a:t>Add</a:t>
-            </a:r>
+              <a:t>Press the ‘Add </a:t>
+            </a:r>
+          </a:p>
+          <a:p>
+            <a:pPr algn="ctr"/>
             <a:r>
               <a:rPr lang="it-IT" sz="800" dirty="0"/>
-              <a:t> </a:t>
-            </a:r>
-          </a:p>
-          <a:p>
-            <a:pPr algn="ctr"/>
-            <a:r>
-              <a:rPr lang="it-IT" sz="800" dirty="0" err="1"/>
-              <a:t>Foodtuff</a:t>
-            </a:r>
-            <a:r>
-              <a:rPr lang="it-IT" sz="800" dirty="0"/>
-              <a:t>’ </a:t>
-            </a:r>
-            <a:r>
-              <a:rPr lang="it-IT" sz="800" dirty="0" err="1"/>
-              <a:t>button</a:t>
-            </a:r>
-            <a:endParaRPr lang="it-IT" sz="800" dirty="0"/>
+              <a:t>Foodtuff’ button</a:t>
+            </a:r>
           </a:p>
         </p:txBody>
       </p:sp>
@@ -6870,10 +6635,9 @@
           <a:p>
             <a:pPr algn="ctr"/>
             <a:r>
-              <a:rPr lang="it-IT" sz="800" u="sng" dirty="0" err="1"/>
+              <a:rPr lang="it-IT" sz="800" u="sng" dirty="0"/>
               <a:t>button</a:t>
             </a:r>
-            <a:endParaRPr lang="it-IT" sz="800" u="sng" dirty="0"/>
           </a:p>
         </p:txBody>
       </p:sp>
@@ -6892,7 +6656,7 @@
         <p:spPr>
           <a:xfrm>
             <a:off x="6027217" y="2756826"/>
-            <a:ext cx="1761355" cy="418151"/>
+            <a:ext cx="1761355" cy="498102"/>
           </a:xfrm>
           <a:prstGeom prst="ellipse">
             <a:avLst/>
@@ -6933,21 +6697,8 @@
                   <a:schemeClr val="tx1"/>
                 </a:solidFill>
               </a:rPr>
-              <a:t>Windows shop </a:t>
-            </a:r>
-            <a:r>
-              <a:rPr lang="it-IT" sz="1200" dirty="0" err="1">
-                <a:solidFill>
-                  <a:schemeClr val="tx1"/>
-                </a:solidFill>
-              </a:rPr>
-              <a:t>overview</a:t>
-            </a:r>
-            <a:endParaRPr lang="it-IT" sz="1200" dirty="0">
-              <a:solidFill>
-                <a:schemeClr val="tx1"/>
-              </a:solidFill>
-            </a:endParaRPr>
+              <a:t>Windows shop overview</a:t>
+            </a:r>
           </a:p>
         </p:txBody>
       </p:sp>
@@ -6966,7 +6717,7 @@
         <p:spPr>
           <a:xfrm>
             <a:off x="10479163" y="2826228"/>
-            <a:ext cx="865327" cy="375375"/>
+            <a:ext cx="865327" cy="447147"/>
           </a:xfrm>
           <a:prstGeom prst="ellipse">
             <a:avLst/>
@@ -7049,10 +6800,9 @@
           <a:p>
             <a:pPr algn="ctr"/>
             <a:r>
-              <a:rPr lang="it-IT" sz="800" dirty="0" err="1"/>
+              <a:rPr lang="it-IT" sz="800" dirty="0"/>
               <a:t>button</a:t>
             </a:r>
-            <a:endParaRPr lang="it-IT" sz="800" dirty="0"/>
           </a:p>
         </p:txBody>
       </p:sp>
@@ -7087,32 +6837,15 @@
             <a:pPr algn="ctr"/>
             <a:r>
               <a:rPr lang="it-IT" sz="800" dirty="0"/>
-              <a:t>Press the ‘</a:t>
-            </a:r>
-            <a:r>
-              <a:rPr lang="it-IT" sz="800" dirty="0" err="1"/>
-              <a:t>Send</a:t>
-            </a:r>
+              <a:t>Press the ‘Send to</a:t>
+            </a:r>
+          </a:p>
+          <a:p>
+            <a:pPr algn="ctr"/>
             <a:r>
               <a:rPr lang="it-IT" sz="800" dirty="0"/>
-              <a:t> to</a:t>
-            </a:r>
-          </a:p>
-          <a:p>
-            <a:pPr algn="ctr"/>
-            <a:r>
-              <a:rPr lang="it-IT" sz="800" dirty="0" err="1"/>
-              <a:t>Costumers</a:t>
-            </a:r>
-            <a:r>
-              <a:rPr lang="it-IT" sz="800" dirty="0"/>
-              <a:t>’ </a:t>
-            </a:r>
-            <a:r>
-              <a:rPr lang="it-IT" sz="800" dirty="0" err="1"/>
-              <a:t>button</a:t>
-            </a:r>
-            <a:endParaRPr lang="it-IT" sz="800" dirty="0"/>
+              <a:t>Costumers’ button</a:t>
+            </a:r>
           </a:p>
         </p:txBody>
       </p:sp>
@@ -7134,7 +6867,7 @@
         </p:nvCxnSpPr>
         <p:spPr>
           <a:xfrm>
-            <a:off x="1151083" y="2965903"/>
+            <a:off x="1151083" y="3005878"/>
             <a:ext cx="1210416" cy="14451"/>
           </a:xfrm>
           <a:prstGeom prst="straightConnector1">
@@ -7180,7 +6913,7 @@
         </p:nvCxnSpPr>
         <p:spPr>
           <a:xfrm flipV="1">
-            <a:off x="3988734" y="2965902"/>
+            <a:off x="3988734" y="3005877"/>
             <a:ext cx="2038483" cy="14452"/>
           </a:xfrm>
           <a:prstGeom prst="straightConnector1">
@@ -7226,8 +6959,8 @@
         </p:nvCxnSpPr>
         <p:spPr>
           <a:xfrm>
-            <a:off x="7788572" y="2965902"/>
-            <a:ext cx="2602742" cy="43639"/>
+            <a:off x="7788572" y="3005877"/>
+            <a:ext cx="2602742" cy="47448"/>
           </a:xfrm>
           <a:prstGeom prst="straightConnector1">
             <a:avLst/>
@@ -7270,8 +7003,8 @@
         </p:nvCxnSpPr>
         <p:spPr>
           <a:xfrm flipV="1">
-            <a:off x="2903961" y="1840467"/>
-            <a:ext cx="0" cy="930812"/>
+            <a:off x="2903961" y="1875688"/>
+            <a:ext cx="0" cy="895591"/>
           </a:xfrm>
           <a:prstGeom prst="straightConnector1">
             <a:avLst/>
@@ -7316,7 +7049,7 @@
         </p:nvCxnSpPr>
         <p:spPr>
           <a:xfrm>
-            <a:off x="3747245" y="1483553"/>
+            <a:off x="3747245" y="1495261"/>
             <a:ext cx="2448687" cy="28215"/>
           </a:xfrm>
           <a:prstGeom prst="straightConnector1">
@@ -7362,7 +7095,7 @@
         </p:nvCxnSpPr>
         <p:spPr>
           <a:xfrm flipH="1" flipV="1">
-            <a:off x="3747245" y="1779230"/>
+            <a:off x="3747245" y="1847473"/>
             <a:ext cx="2448687" cy="28215"/>
           </a:xfrm>
           <a:prstGeom prst="straightConnector1">
@@ -7406,8 +7139,8 @@
         </p:nvCxnSpPr>
         <p:spPr>
           <a:xfrm>
-            <a:off x="3424475" y="1840467"/>
-            <a:ext cx="6622" cy="930812"/>
+            <a:off x="3434408" y="1920418"/>
+            <a:ext cx="0" cy="860130"/>
           </a:xfrm>
           <a:prstGeom prst="straightConnector1">
             <a:avLst/>
@@ -7478,8 +7211,8 @@
         </p:nvSpPr>
         <p:spPr>
           <a:xfrm>
-            <a:off x="1709060" y="4866161"/>
-            <a:ext cx="1181368" cy="605120"/>
+            <a:off x="3456716" y="4402049"/>
+            <a:ext cx="1088652" cy="476552"/>
           </a:xfrm>
           <a:prstGeom prst="ellipse">
             <a:avLst/>
@@ -7532,8 +7265,8 @@
         </p:nvSpPr>
         <p:spPr>
           <a:xfrm>
-            <a:off x="3053486" y="1867599"/>
-            <a:ext cx="2508415" cy="640709"/>
+            <a:off x="3053487" y="1867600"/>
+            <a:ext cx="1896018" cy="504580"/>
           </a:xfrm>
           <a:prstGeom prst="ellipse">
             <a:avLst/>
@@ -7569,42 +7302,13 @@
           <a:p>
             <a:pPr algn="ctr"/>
             <a:r>
-              <a:rPr lang="it-IT" dirty="0">
+              <a:rPr lang="it-IT" sz="1200" dirty="0">
                 <a:solidFill>
                   <a:schemeClr val="tx1"/>
                 </a:solidFill>
               </a:rPr>
-              <a:t>Browsing </a:t>
-            </a:r>
-            <a:r>
-              <a:rPr lang="it-IT" dirty="0" err="1">
-                <a:solidFill>
-                  <a:schemeClr val="tx1"/>
-                </a:solidFill>
-              </a:rPr>
-              <a:t>telegram</a:t>
-            </a:r>
-            <a:r>
-              <a:rPr lang="it-IT" dirty="0">
-                <a:solidFill>
-                  <a:schemeClr val="tx1"/>
-                </a:solidFill>
-              </a:rPr>
-              <a:t> </a:t>
-            </a:r>
-            <a:r>
-              <a:rPr lang="it-IT" dirty="0" err="1">
-                <a:solidFill>
-                  <a:schemeClr val="tx1"/>
-                </a:solidFill>
-              </a:rPr>
-              <a:t>contacs</a:t>
-            </a:r>
-            <a:endParaRPr lang="it-IT" dirty="0">
-              <a:solidFill>
-                <a:schemeClr val="tx1"/>
-              </a:solidFill>
-            </a:endParaRPr>
+              <a:t>Browsing telegram contacs</a:t>
+            </a:r>
           </a:p>
         </p:txBody>
       </p:sp>
@@ -7622,8 +7326,8 @@
         </p:nvSpPr>
         <p:spPr>
           <a:xfrm>
-            <a:off x="1023458" y="1867599"/>
-            <a:ext cx="1132514" cy="640709"/>
+            <a:off x="1023458" y="1867600"/>
+            <a:ext cx="1043632" cy="504580"/>
           </a:xfrm>
           <a:prstGeom prst="ellipse">
             <a:avLst/>
@@ -7676,8 +7380,8 @@
         </p:nvSpPr>
         <p:spPr>
           <a:xfrm>
-            <a:off x="1098955" y="1923699"/>
-            <a:ext cx="989901" cy="528507"/>
+            <a:off x="1098956" y="1923699"/>
+            <a:ext cx="912212" cy="416217"/>
           </a:xfrm>
           <a:prstGeom prst="ellipse">
             <a:avLst/>
@@ -7713,64 +7417,21 @@
           <a:p>
             <a:pPr algn="ctr"/>
             <a:r>
-              <a:rPr lang="it-IT" dirty="0">
+              <a:rPr lang="it-IT" sz="1400" b="1" dirty="0">
                 <a:solidFill>
                   <a:schemeClr val="tx1"/>
                 </a:solidFill>
               </a:rPr>
               <a:t>Start</a:t>
             </a:r>
-          </a:p>
-        </p:txBody>
-      </p:sp>
-      <p:cxnSp>
-        <p:nvCxnSpPr>
-          <p:cNvPr id="8" name="Connettore curvo 7">
-            <a:extLst>
-              <a:ext uri="{FF2B5EF4-FFF2-40B4-BE49-F238E27FC236}">
-                <a16:creationId xmlns:a16="http://schemas.microsoft.com/office/drawing/2014/main" id="{12BDE4A9-D037-4749-BD81-B5CCC19F77CA}"/>
-              </a:ext>
-            </a:extLst>
-          </p:cNvPr>
-          <p:cNvCxnSpPr>
-            <a:cxnSpLocks/>
-            <a:endCxn id="5" idx="0"/>
-          </p:cNvCxnSpPr>
-          <p:nvPr/>
-        </p:nvCxnSpPr>
-        <p:spPr>
-          <a:xfrm flipV="1">
-            <a:off x="1996469" y="1867599"/>
-            <a:ext cx="2311225" cy="100180"/>
-          </a:xfrm>
-          <a:prstGeom prst="curvedConnector4">
-            <a:avLst>
-              <a:gd name="adj1" fmla="val 22867"/>
-              <a:gd name="adj2" fmla="val 328189"/>
-            </a:avLst>
-          </a:prstGeom>
-          <a:ln>
-            <a:solidFill>
-              <a:schemeClr val="tx1"/>
-            </a:solidFill>
-            <a:tailEnd type="triangle"/>
-          </a:ln>
-        </p:spPr>
-        <p:style>
-          <a:lnRef idx="1">
-            <a:schemeClr val="accent1"/>
-          </a:lnRef>
-          <a:fillRef idx="0">
-            <a:schemeClr val="accent1"/>
-          </a:fillRef>
-          <a:effectRef idx="0">
-            <a:schemeClr val="accent1"/>
-          </a:effectRef>
-          <a:fontRef idx="minor">
-            <a:schemeClr val="tx1"/>
-          </a:fontRef>
-        </p:style>
-      </p:cxnSp>
+            <a:endParaRPr lang="it-IT" b="1" dirty="0">
+              <a:solidFill>
+                <a:schemeClr val="tx1"/>
+              </a:solidFill>
+            </a:endParaRPr>
+          </a:p>
+        </p:txBody>
+      </p:sp>
       <p:sp>
         <p:nvSpPr>
           <p:cNvPr id="18" name="CasellaDiTesto 17">
@@ -7785,8 +7446,8 @@
         </p:nvSpPr>
         <p:spPr>
           <a:xfrm>
-            <a:off x="2419674" y="1284939"/>
-            <a:ext cx="724877" cy="338554"/>
+            <a:off x="2098991" y="1806302"/>
+            <a:ext cx="815114" cy="338554"/>
           </a:xfrm>
           <a:prstGeom prst="rect">
             <a:avLst/>
@@ -7794,7 +7455,7 @@
           <a:noFill/>
         </p:spPr>
         <p:txBody>
-          <a:bodyPr wrap="none" rtlCol="0">
+          <a:bodyPr wrap="square" rtlCol="0">
             <a:spAutoFit/>
           </a:bodyPr>
           <a:lstStyle/>
@@ -7809,15 +7470,7 @@
             <a:pPr algn="ctr"/>
             <a:r>
               <a:rPr lang="it-IT" sz="800" dirty="0"/>
-              <a:t>‘</a:t>
-            </a:r>
-            <a:r>
-              <a:rPr lang="it-IT" sz="800" dirty="0" err="1"/>
-              <a:t>Search</a:t>
-            </a:r>
-            <a:r>
-              <a:rPr lang="it-IT" sz="800" dirty="0"/>
-              <a:t>’ field</a:t>
+              <a:t>‘Search’ field</a:t>
             </a:r>
           </a:p>
         </p:txBody>
@@ -7836,8 +7489,8 @@
         </p:nvSpPr>
         <p:spPr>
           <a:xfrm>
-            <a:off x="7099881" y="1867599"/>
-            <a:ext cx="2399514" cy="640709"/>
+            <a:off x="5620841" y="1867600"/>
+            <a:ext cx="1719526" cy="504580"/>
           </a:xfrm>
           <a:prstGeom prst="ellipse">
             <a:avLst/>
@@ -7873,75 +7526,16 @@
           <a:p>
             <a:pPr algn="ctr"/>
             <a:r>
-              <a:rPr lang="it-IT" dirty="0">
+              <a:rPr lang="it-IT" sz="1200" dirty="0">
                 <a:solidFill>
                   <a:schemeClr val="tx1"/>
                 </a:solidFill>
               </a:rPr>
-              <a:t>Operator Group </a:t>
-            </a:r>
-            <a:r>
-              <a:rPr lang="it-IT" dirty="0" err="1">
-                <a:solidFill>
-                  <a:schemeClr val="tx1"/>
-                </a:solidFill>
-              </a:rPr>
-              <a:t>overview</a:t>
-            </a:r>
-            <a:endParaRPr lang="it-IT" dirty="0">
-              <a:solidFill>
-                <a:schemeClr val="tx1"/>
-              </a:solidFill>
-            </a:endParaRPr>
-          </a:p>
-        </p:txBody>
-      </p:sp>
-      <p:cxnSp>
-        <p:nvCxnSpPr>
-          <p:cNvPr id="44" name="Connettore curvo 43">
-            <a:extLst>
-              <a:ext uri="{FF2B5EF4-FFF2-40B4-BE49-F238E27FC236}">
-                <a16:creationId xmlns:a16="http://schemas.microsoft.com/office/drawing/2014/main" id="{5131291F-4DFE-4CD7-922B-EB463A708A09}"/>
-              </a:ext>
-            </a:extLst>
-          </p:cNvPr>
-          <p:cNvCxnSpPr>
-            <a:cxnSpLocks/>
-          </p:cNvCxnSpPr>
-          <p:nvPr/>
-        </p:nvCxnSpPr>
-        <p:spPr>
-          <a:xfrm rot="5400000" flipH="1" flipV="1">
-            <a:off x="6330891" y="886737"/>
-            <a:ext cx="12700" cy="2149384"/>
-          </a:xfrm>
-          <a:prstGeom prst="curvedConnector3">
-            <a:avLst>
-              <a:gd name="adj1" fmla="val 2538819"/>
-            </a:avLst>
-          </a:prstGeom>
-          <a:ln>
-            <a:solidFill>
-              <a:schemeClr val="tx1"/>
-            </a:solidFill>
-            <a:tailEnd type="triangle"/>
-          </a:ln>
-        </p:spPr>
-        <p:style>
-          <a:lnRef idx="1">
-            <a:schemeClr val="accent1"/>
-          </a:lnRef>
-          <a:fillRef idx="0">
-            <a:schemeClr val="accent1"/>
-          </a:fillRef>
-          <a:effectRef idx="0">
-            <a:schemeClr val="accent1"/>
-          </a:effectRef>
-          <a:fontRef idx="minor">
-            <a:schemeClr val="tx1"/>
-          </a:fontRef>
-        </p:style>
-      </p:cxnSp>
+              <a:t>Operator Group overview</a:t>
+            </a:r>
+          </a:p>
+        </p:txBody>
+      </p:sp>
       <p:sp>
         <p:nvSpPr>
           <p:cNvPr id="47" name="CasellaDiTesto 46">
@@ -7956,8 +7550,8 @@
         </p:nvSpPr>
         <p:spPr>
           <a:xfrm>
-            <a:off x="5699894" y="1284939"/>
-            <a:ext cx="1274709" cy="338554"/>
+            <a:off x="4532458" y="1653014"/>
+            <a:ext cx="1329440" cy="338554"/>
           </a:xfrm>
           <a:prstGeom prst="rect">
             <a:avLst/>
@@ -7965,7 +7559,7 @@
           <a:noFill/>
         </p:spPr>
         <p:txBody>
-          <a:bodyPr wrap="none" rtlCol="0">
+          <a:bodyPr wrap="square" rtlCol="0">
             <a:spAutoFit/>
           </a:bodyPr>
           <a:lstStyle/>
@@ -7973,28 +7567,15 @@
             <a:pPr algn="ctr"/>
             <a:r>
               <a:rPr lang="it-IT" sz="800" dirty="0"/>
-              <a:t>Press on </a:t>
-            </a:r>
-            <a:r>
-              <a:rPr lang="it-IT" sz="800" dirty="0" err="1"/>
-              <a:t>contact</a:t>
-            </a:r>
+              <a:t>Press on contact </a:t>
+            </a:r>
+          </a:p>
+          <a:p>
+            <a:pPr algn="ctr"/>
             <a:r>
               <a:rPr lang="it-IT" sz="800" dirty="0"/>
-              <a:t> </a:t>
-            </a:r>
-          </a:p>
-          <a:p>
-            <a:pPr algn="ctr"/>
-            <a:r>
-              <a:rPr lang="it-IT" sz="800" dirty="0"/>
-              <a:t>‘Operator Group’ </a:t>
-            </a:r>
-            <a:r>
-              <a:rPr lang="it-IT" sz="800" dirty="0" err="1"/>
-              <a:t>choseen</a:t>
-            </a:r>
-            <a:endParaRPr lang="it-IT" sz="800" dirty="0"/>
+              <a:t>‘Operator Group’ choseen</a:t>
+            </a:r>
           </a:p>
         </p:txBody>
       </p:sp>
@@ -8012,8 +7593,8 @@
         </p:nvSpPr>
         <p:spPr>
           <a:xfrm>
-            <a:off x="8590915" y="4486870"/>
-            <a:ext cx="2229705" cy="640709"/>
+            <a:off x="8660706" y="1866988"/>
+            <a:ext cx="2054714" cy="504580"/>
           </a:xfrm>
           <a:prstGeom prst="ellipse">
             <a:avLst/>
@@ -8049,77 +7630,16 @@
           <a:p>
             <a:pPr algn="ctr"/>
             <a:r>
-              <a:rPr lang="it-IT" dirty="0">
+              <a:rPr lang="it-IT" sz="1200" dirty="0">
                 <a:solidFill>
                   <a:schemeClr val="tx1"/>
                 </a:solidFill>
               </a:rPr>
-              <a:t>Write the </a:t>
-            </a:r>
-            <a:r>
-              <a:rPr lang="it-IT" dirty="0" err="1">
-                <a:solidFill>
-                  <a:schemeClr val="tx1"/>
-                </a:solidFill>
-              </a:rPr>
-              <a:t>foodstuff</a:t>
-            </a:r>
-            <a:r>
-              <a:rPr lang="it-IT" dirty="0">
-                <a:solidFill>
-                  <a:schemeClr val="tx1"/>
-                </a:solidFill>
-              </a:rPr>
-              <a:t> price</a:t>
-            </a:r>
-          </a:p>
-        </p:txBody>
-      </p:sp>
-      <p:cxnSp>
-        <p:nvCxnSpPr>
-          <p:cNvPr id="50" name="Connettore curvo 49">
-            <a:extLst>
-              <a:ext uri="{FF2B5EF4-FFF2-40B4-BE49-F238E27FC236}">
-                <a16:creationId xmlns:a16="http://schemas.microsoft.com/office/drawing/2014/main" id="{90B90F0C-5409-4B6C-A890-A1B1BA35E656}"/>
-              </a:ext>
-            </a:extLst>
-          </p:cNvPr>
-          <p:cNvCxnSpPr>
-            <a:cxnSpLocks/>
-            <a:stCxn id="26" idx="6"/>
-          </p:cNvCxnSpPr>
-          <p:nvPr/>
-        </p:nvCxnSpPr>
-        <p:spPr>
-          <a:xfrm>
-            <a:off x="9499395" y="2187954"/>
-            <a:ext cx="994692" cy="2392746"/>
-          </a:xfrm>
-          <a:prstGeom prst="curvedConnector2">
-            <a:avLst/>
-          </a:prstGeom>
-          <a:ln>
-            <a:solidFill>
-              <a:schemeClr val="tx1"/>
-            </a:solidFill>
-            <a:tailEnd type="triangle"/>
-          </a:ln>
-        </p:spPr>
-        <p:style>
-          <a:lnRef idx="1">
-            <a:schemeClr val="accent1"/>
-          </a:lnRef>
-          <a:fillRef idx="0">
-            <a:schemeClr val="accent1"/>
-          </a:fillRef>
-          <a:effectRef idx="0">
-            <a:schemeClr val="accent1"/>
-          </a:effectRef>
-          <a:fontRef idx="minor">
-            <a:schemeClr val="tx1"/>
-          </a:fontRef>
-        </p:style>
-      </p:cxnSp>
+              <a:t>Write the foodstuff price</a:t>
+            </a:r>
+          </a:p>
+        </p:txBody>
+      </p:sp>
       <p:sp>
         <p:nvSpPr>
           <p:cNvPr id="56" name="CasellaDiTesto 55">
@@ -8134,8 +7654,8 @@
         </p:nvSpPr>
         <p:spPr>
           <a:xfrm>
-            <a:off x="10266695" y="3215050"/>
-            <a:ext cx="1024639" cy="338554"/>
+            <a:off x="7351077" y="1653014"/>
+            <a:ext cx="1091503" cy="338554"/>
           </a:xfrm>
           <a:prstGeom prst="rect">
             <a:avLst/>
@@ -8143,7 +7663,7 @@
           <a:noFill/>
         </p:spPr>
         <p:txBody>
-          <a:bodyPr wrap="none" rtlCol="0">
+          <a:bodyPr wrap="square" rtlCol="0">
             <a:spAutoFit/>
           </a:bodyPr>
           <a:lstStyle/>
@@ -8151,73 +7671,18 @@
             <a:pPr algn="ctr"/>
             <a:r>
               <a:rPr lang="it-IT" sz="800" dirty="0"/>
-              <a:t>Press the ‘</a:t>
-            </a:r>
-            <a:r>
-              <a:rPr lang="it-IT" sz="800" dirty="0" err="1"/>
-              <a:t>Foodtuff</a:t>
-            </a:r>
+              <a:t>Press the ‘Foodtuff’ </a:t>
+            </a:r>
+          </a:p>
+          <a:p>
+            <a:pPr algn="ctr"/>
             <a:r>
               <a:rPr lang="it-IT" sz="800" dirty="0"/>
-              <a:t>’ </a:t>
-            </a:r>
-          </a:p>
-          <a:p>
-            <a:pPr algn="ctr"/>
-            <a:r>
-              <a:rPr lang="it-IT" sz="800" dirty="0" err="1"/>
               <a:t>button</a:t>
             </a:r>
-            <a:endParaRPr lang="it-IT" sz="800" dirty="0"/>
-          </a:p>
-        </p:txBody>
-      </p:sp>
-      <p:cxnSp>
-        <p:nvCxnSpPr>
-          <p:cNvPr id="72" name="Connettore curvo 71">
-            <a:extLst>
-              <a:ext uri="{FF2B5EF4-FFF2-40B4-BE49-F238E27FC236}">
-                <a16:creationId xmlns:a16="http://schemas.microsoft.com/office/drawing/2014/main" id="{C8F10790-2840-4BE1-8DB4-B5E8D4E712C6}"/>
-              </a:ext>
-            </a:extLst>
-          </p:cNvPr>
-          <p:cNvCxnSpPr>
-            <a:cxnSpLocks/>
-          </p:cNvCxnSpPr>
-          <p:nvPr/>
-        </p:nvCxnSpPr>
-        <p:spPr>
-          <a:xfrm rot="16200000" flipV="1">
-            <a:off x="7078405" y="2741656"/>
-            <a:ext cx="2166222" cy="1511865"/>
-          </a:xfrm>
-          <a:prstGeom prst="curvedConnector3">
-            <a:avLst>
-              <a:gd name="adj1" fmla="val 50000"/>
-            </a:avLst>
-          </a:prstGeom>
-          <a:ln>
-            <a:solidFill>
-              <a:schemeClr val="tx1"/>
-            </a:solidFill>
-            <a:tailEnd type="triangle"/>
-          </a:ln>
-        </p:spPr>
-        <p:style>
-          <a:lnRef idx="1">
-            <a:schemeClr val="accent1"/>
-          </a:lnRef>
-          <a:fillRef idx="0">
-            <a:schemeClr val="accent1"/>
-          </a:fillRef>
-          <a:effectRef idx="0">
-            <a:schemeClr val="accent1"/>
-          </a:effectRef>
-          <a:fontRef idx="minor">
-            <a:schemeClr val="tx1"/>
-          </a:fontRef>
-        </p:style>
-      </p:cxnSp>
+          </a:p>
+        </p:txBody>
+      </p:sp>
       <p:sp>
         <p:nvSpPr>
           <p:cNvPr id="73" name="CasellaDiTesto 72">
@@ -8232,8 +7697,8 @@
         </p:nvSpPr>
         <p:spPr>
           <a:xfrm>
-            <a:off x="8186454" y="3215050"/>
-            <a:ext cx="877163" cy="338554"/>
+            <a:off x="7433842" y="2318665"/>
+            <a:ext cx="925975" cy="338554"/>
           </a:xfrm>
           <a:prstGeom prst="rect">
             <a:avLst/>
@@ -8241,7 +7706,7 @@
           <a:noFill/>
         </p:spPr>
         <p:txBody>
-          <a:bodyPr wrap="none" rtlCol="0">
+          <a:bodyPr wrap="square" rtlCol="0">
             <a:spAutoFit/>
           </a:bodyPr>
           <a:lstStyle/>
@@ -8249,82 +7714,18 @@
             <a:pPr algn="ctr"/>
             <a:r>
               <a:rPr lang="it-IT" sz="800" dirty="0"/>
-              <a:t>Press the ‘</a:t>
-            </a:r>
-            <a:r>
-              <a:rPr lang="it-IT" sz="800" dirty="0" err="1"/>
-              <a:t>Add</a:t>
-            </a:r>
+              <a:t>Press the ‘Add </a:t>
+            </a:r>
+          </a:p>
+          <a:p>
+            <a:pPr algn="ctr"/>
             <a:r>
               <a:rPr lang="it-IT" sz="800" dirty="0"/>
-              <a:t> </a:t>
-            </a:r>
-          </a:p>
-          <a:p>
-            <a:pPr algn="ctr"/>
-            <a:r>
-              <a:rPr lang="it-IT" sz="800" dirty="0" err="1"/>
-              <a:t>Foodtuff</a:t>
-            </a:r>
-            <a:r>
-              <a:rPr lang="it-IT" sz="800" dirty="0"/>
-              <a:t>’ </a:t>
-            </a:r>
-            <a:r>
-              <a:rPr lang="it-IT" sz="800" dirty="0" err="1"/>
-              <a:t>button</a:t>
-            </a:r>
-            <a:endParaRPr lang="it-IT" sz="800" dirty="0"/>
-          </a:p>
-        </p:txBody>
-      </p:sp>
-      <p:cxnSp>
-        <p:nvCxnSpPr>
-          <p:cNvPr id="75" name="Connettore curvo 74">
-            <a:extLst>
-              <a:ext uri="{FF2B5EF4-FFF2-40B4-BE49-F238E27FC236}">
-                <a16:creationId xmlns:a16="http://schemas.microsoft.com/office/drawing/2014/main" id="{76600392-183A-445A-A0C6-4E8EED389736}"/>
-              </a:ext>
-            </a:extLst>
-          </p:cNvPr>
-          <p:cNvCxnSpPr>
-            <a:cxnSpLocks/>
-          </p:cNvCxnSpPr>
-          <p:nvPr/>
-        </p:nvCxnSpPr>
-        <p:spPr>
-          <a:xfrm rot="10800000" flipV="1">
-            <a:off x="5256199" y="2187954"/>
-            <a:ext cx="1843682" cy="226524"/>
-          </a:xfrm>
-          <a:prstGeom prst="curvedConnector4">
-            <a:avLst>
-              <a:gd name="adj1" fmla="val 41709"/>
-              <a:gd name="adj2" fmla="val 242338"/>
-            </a:avLst>
-          </a:prstGeom>
-          <a:ln>
-            <a:solidFill>
-              <a:schemeClr val="tx1"/>
-            </a:solidFill>
-            <a:tailEnd type="triangle"/>
-          </a:ln>
-        </p:spPr>
-        <p:style>
-          <a:lnRef idx="1">
-            <a:schemeClr val="accent1"/>
-          </a:lnRef>
-          <a:fillRef idx="0">
-            <a:schemeClr val="accent1"/>
-          </a:fillRef>
-          <a:effectRef idx="0">
-            <a:schemeClr val="accent1"/>
-          </a:effectRef>
-          <a:fontRef idx="minor">
-            <a:schemeClr val="tx1"/>
-          </a:fontRef>
-        </p:style>
-      </p:cxnSp>
+              <a:t>Foodtuff’ button</a:t>
+            </a:r>
+          </a:p>
+        </p:txBody>
+      </p:sp>
       <p:sp>
         <p:nvSpPr>
           <p:cNvPr id="80" name="CasellaDiTesto 79">
@@ -8339,8 +7740,8 @@
         </p:nvSpPr>
         <p:spPr>
           <a:xfrm>
-            <a:off x="5202567" y="2734832"/>
-            <a:ext cx="1293944" cy="338554"/>
+            <a:off x="4592243" y="2283024"/>
+            <a:ext cx="1302843" cy="338554"/>
           </a:xfrm>
           <a:prstGeom prst="rect">
             <a:avLst/>
@@ -8348,7 +7749,7 @@
           <a:noFill/>
         </p:spPr>
         <p:txBody>
-          <a:bodyPr wrap="none" rtlCol="0">
+          <a:bodyPr wrap="square" rtlCol="0">
             <a:spAutoFit/>
           </a:bodyPr>
           <a:lstStyle/>
@@ -8363,13 +7764,8 @@
             <a:pPr algn="ctr"/>
             <a:r>
               <a:rPr lang="it-IT" sz="800" dirty="0"/>
-              <a:t>Press the ‘Back’ </a:t>
-            </a:r>
-            <a:r>
-              <a:rPr lang="it-IT" sz="800" dirty="0" err="1"/>
-              <a:t>button</a:t>
-            </a:r>
-            <a:endParaRPr lang="it-IT" sz="800" dirty="0"/>
+              <a:t>Press the ‘Back’ button</a:t>
+            </a:r>
           </a:p>
         </p:txBody>
       </p:sp>
@@ -8387,8 +7783,8 @@
         </p:nvSpPr>
         <p:spPr>
           <a:xfrm>
-            <a:off x="1722143" y="3223611"/>
-            <a:ext cx="2406288" cy="640709"/>
+            <a:off x="3053485" y="3171593"/>
+            <a:ext cx="1896019" cy="504580"/>
           </a:xfrm>
           <a:prstGeom prst="ellipse">
             <a:avLst/>
@@ -8424,28 +7820,12 @@
           <a:p>
             <a:pPr algn="ctr"/>
             <a:r>
-              <a:rPr lang="it-IT" dirty="0">
+              <a:rPr lang="it-IT" sz="1200" dirty="0">
                 <a:solidFill>
                   <a:schemeClr val="tx1"/>
                 </a:solidFill>
               </a:rPr>
-              <a:t>Chat with ‘</a:t>
-            </a:r>
-            <a:r>
-              <a:rPr lang="it-IT" dirty="0" err="1">
-                <a:solidFill>
-                  <a:schemeClr val="tx1"/>
-                </a:solidFill>
-              </a:rPr>
-              <a:t>ColligoBot</a:t>
-            </a:r>
-            <a:r>
-              <a:rPr lang="it-IT" dirty="0">
-                <a:solidFill>
-                  <a:schemeClr val="tx1"/>
-                </a:solidFill>
-              </a:rPr>
-              <a:t>’</a:t>
+              <a:t>Chat with ‘ColligoBot’</a:t>
             </a:r>
           </a:p>
         </p:txBody>
@@ -8464,8 +7844,8 @@
         </p:nvSpPr>
         <p:spPr>
           <a:xfrm>
-            <a:off x="1768382" y="4905912"/>
-            <a:ext cx="1062724" cy="506435"/>
+            <a:off x="3511382" y="4440907"/>
+            <a:ext cx="979320" cy="398835"/>
           </a:xfrm>
           <a:prstGeom prst="ellipse">
             <a:avLst/>
@@ -8501,41 +7881,165 @@
           <a:p>
             <a:pPr algn="ctr"/>
             <a:r>
-              <a:rPr lang="it-IT" dirty="0">
+              <a:rPr lang="it-IT" sz="1400" b="1" dirty="0">
                 <a:solidFill>
                   <a:schemeClr val="tx1"/>
                 </a:solidFill>
               </a:rPr>
               <a:t>Finish</a:t>
             </a:r>
+            <a:endParaRPr lang="it-IT" b="1" dirty="0">
+              <a:solidFill>
+                <a:schemeClr val="tx1"/>
+              </a:solidFill>
+            </a:endParaRPr>
+          </a:p>
+        </p:txBody>
+      </p:sp>
+      <p:sp>
+        <p:nvSpPr>
+          <p:cNvPr id="103" name="CasellaDiTesto 102">
+            <a:extLst>
+              <a:ext uri="{FF2B5EF4-FFF2-40B4-BE49-F238E27FC236}">
+                <a16:creationId xmlns:a16="http://schemas.microsoft.com/office/drawing/2014/main" id="{C89F1172-5825-4FAB-A83D-3714FA7EF00F}"/>
+              </a:ext>
+            </a:extLst>
+          </p:cNvPr>
+          <p:cNvSpPr txBox="1"/>
+          <p:nvPr/>
+        </p:nvSpPr>
+        <p:spPr>
+          <a:xfrm>
+            <a:off x="3190923" y="2538206"/>
+            <a:ext cx="956754" cy="338554"/>
+          </a:xfrm>
+          <a:prstGeom prst="rect">
+            <a:avLst/>
+          </a:prstGeom>
+          <a:noFill/>
+        </p:spPr>
+        <p:txBody>
+          <a:bodyPr wrap="square" rtlCol="0">
+            <a:spAutoFit/>
+          </a:bodyPr>
+          <a:lstStyle/>
+          <a:p>
+            <a:pPr algn="ctr"/>
+            <a:r>
+              <a:rPr lang="it-IT" sz="800" dirty="0"/>
+              <a:t>Press on contact </a:t>
+            </a:r>
+          </a:p>
+          <a:p>
+            <a:pPr algn="ctr"/>
+            <a:r>
+              <a:rPr lang="it-IT" sz="800" dirty="0"/>
+              <a:t>‘Colligo Bot’ </a:t>
+            </a:r>
+          </a:p>
+        </p:txBody>
+      </p:sp>
+      <p:sp>
+        <p:nvSpPr>
+          <p:cNvPr id="104" name="CasellaDiTesto 103">
+            <a:extLst>
+              <a:ext uri="{FF2B5EF4-FFF2-40B4-BE49-F238E27FC236}">
+                <a16:creationId xmlns:a16="http://schemas.microsoft.com/office/drawing/2014/main" id="{F9B5BDC1-5A3C-4114-8027-6A369E17FD58}"/>
+              </a:ext>
+            </a:extLst>
+          </p:cNvPr>
+          <p:cNvSpPr txBox="1"/>
+          <p:nvPr/>
+        </p:nvSpPr>
+        <p:spPr>
+          <a:xfrm>
+            <a:off x="3223046" y="3869834"/>
+            <a:ext cx="892508" cy="338554"/>
+          </a:xfrm>
+          <a:prstGeom prst="rect">
+            <a:avLst/>
+          </a:prstGeom>
+          <a:noFill/>
+        </p:spPr>
+        <p:txBody>
+          <a:bodyPr wrap="square" rtlCol="0">
+            <a:spAutoFit/>
+          </a:bodyPr>
+          <a:lstStyle/>
+          <a:p>
+            <a:pPr algn="ctr"/>
+            <a:r>
+              <a:rPr lang="it-IT" sz="800" dirty="0"/>
+              <a:t>Paste and send</a:t>
+            </a:r>
+          </a:p>
+          <a:p>
+            <a:pPr algn="ctr"/>
+            <a:r>
+              <a:rPr lang="it-IT" sz="800" dirty="0"/>
+              <a:t>‘Operator Token’</a:t>
+            </a:r>
+          </a:p>
+        </p:txBody>
+      </p:sp>
+      <p:sp>
+        <p:nvSpPr>
+          <p:cNvPr id="114" name="Titolo 113">
+            <a:extLst>
+              <a:ext uri="{FF2B5EF4-FFF2-40B4-BE49-F238E27FC236}">
+                <a16:creationId xmlns:a16="http://schemas.microsoft.com/office/drawing/2014/main" id="{45C0AF18-60B4-4DD9-BE7C-840BDB44D47C}"/>
+              </a:ext>
+            </a:extLst>
+          </p:cNvPr>
+          <p:cNvSpPr>
+            <a:spLocks noGrp="1"/>
+          </p:cNvSpPr>
+          <p:nvPr>
+            <p:ph type="ctrTitle"/>
+          </p:nvPr>
+        </p:nvSpPr>
+        <p:spPr>
+          <a:xfrm>
+            <a:off x="1247314" y="341787"/>
+            <a:ext cx="9144000" cy="705081"/>
+          </a:xfrm>
+        </p:spPr>
+        <p:txBody>
+          <a:bodyPr>
+            <a:normAutofit/>
+          </a:bodyPr>
+          <a:lstStyle/>
+          <a:p>
+            <a:r>
+              <a:rPr lang="it-IT" sz="4000" dirty="0"/>
+              <a:t>STN Customer: Registration</a:t>
+            </a:r>
           </a:p>
         </p:txBody>
       </p:sp>
       <p:cxnSp>
         <p:nvCxnSpPr>
-          <p:cNvPr id="85" name="Connettore curvo 84">
-            <a:extLst>
-              <a:ext uri="{FF2B5EF4-FFF2-40B4-BE49-F238E27FC236}">
-                <a16:creationId xmlns:a16="http://schemas.microsoft.com/office/drawing/2014/main" id="{850F41A3-14DD-4078-9229-F86C8C9E865F}"/>
+          <p:cNvPr id="13" name="Connettore 2 12">
+            <a:extLst>
+              <a:ext uri="{FF2B5EF4-FFF2-40B4-BE49-F238E27FC236}">
+                <a16:creationId xmlns:a16="http://schemas.microsoft.com/office/drawing/2014/main" id="{27D0D2FC-BEAD-4FA9-91B8-63EAD3CB067C}"/>
               </a:ext>
             </a:extLst>
           </p:cNvPr>
           <p:cNvCxnSpPr>
             <a:cxnSpLocks/>
-            <a:stCxn id="5" idx="3"/>
-            <a:endCxn id="81" idx="0"/>
+            <a:stCxn id="6" idx="6"/>
+            <a:endCxn id="5" idx="2"/>
           </p:cNvCxnSpPr>
           <p:nvPr/>
         </p:nvCxnSpPr>
         <p:spPr>
-          <a:xfrm rot="5400000">
-            <a:off x="2768495" y="2571270"/>
-            <a:ext cx="809133" cy="495548"/>
-          </a:xfrm>
-          <a:prstGeom prst="curvedConnector3">
-            <a:avLst>
-              <a:gd name="adj1" fmla="val 50000"/>
-            </a:avLst>
+          <a:xfrm>
+            <a:off x="2067090" y="2119890"/>
+            <a:ext cx="986397" cy="0"/>
+          </a:xfrm>
+          <a:prstGeom prst="straightConnector1">
+            <a:avLst/>
           </a:prstGeom>
           <a:ln>
             <a:solidFill>
@@ -8561,29 +8065,27 @@
       </p:cxnSp>
       <p:cxnSp>
         <p:nvCxnSpPr>
-          <p:cNvPr id="96" name="Connettore curvo 95">
-            <a:extLst>
-              <a:ext uri="{FF2B5EF4-FFF2-40B4-BE49-F238E27FC236}">
-                <a16:creationId xmlns:a16="http://schemas.microsoft.com/office/drawing/2014/main" id="{BEAF9AA5-3C2A-454F-A409-A9DB514B7898}"/>
+          <p:cNvPr id="33" name="Connettore 2 32">
+            <a:extLst>
+              <a:ext uri="{FF2B5EF4-FFF2-40B4-BE49-F238E27FC236}">
+                <a16:creationId xmlns:a16="http://schemas.microsoft.com/office/drawing/2014/main" id="{58EB1CFC-AABA-4427-8915-BBD29E9DC337}"/>
               </a:ext>
             </a:extLst>
           </p:cNvPr>
           <p:cNvCxnSpPr>
             <a:cxnSpLocks/>
-            <a:stCxn id="81" idx="3"/>
-            <a:endCxn id="19" idx="1"/>
+            <a:stCxn id="5" idx="4"/>
+            <a:endCxn id="81" idx="0"/>
           </p:cNvCxnSpPr>
           <p:nvPr/>
         </p:nvCxnSpPr>
         <p:spPr>
-          <a:xfrm rot="5400000">
-            <a:off x="1386158" y="4266400"/>
-            <a:ext cx="1184289" cy="192469"/>
-          </a:xfrm>
-          <a:prstGeom prst="curvedConnector3">
-            <a:avLst>
-              <a:gd name="adj1" fmla="val 50000"/>
-            </a:avLst>
+          <a:xfrm flipH="1">
+            <a:off x="4001495" y="2372180"/>
+            <a:ext cx="1" cy="799413"/>
+          </a:xfrm>
+          <a:prstGeom prst="straightConnector1">
+            <a:avLst/>
           </a:prstGeom>
           <a:ln>
             <a:solidFill>
@@ -8607,153 +8109,235 @@
           </a:fontRef>
         </p:style>
       </p:cxnSp>
-      <p:sp>
-        <p:nvSpPr>
-          <p:cNvPr id="103" name="CasellaDiTesto 102">
-            <a:extLst>
-              <a:ext uri="{FF2B5EF4-FFF2-40B4-BE49-F238E27FC236}">
-                <a16:creationId xmlns:a16="http://schemas.microsoft.com/office/drawing/2014/main" id="{C89F1172-5825-4FAB-A83D-3714FA7EF00F}"/>
-              </a:ext>
-            </a:extLst>
-          </p:cNvPr>
-          <p:cNvSpPr txBox="1"/>
-          <p:nvPr/>
-        </p:nvSpPr>
-        <p:spPr>
-          <a:xfrm>
-            <a:off x="1978258" y="2879325"/>
-            <a:ext cx="925253" cy="338554"/>
-          </a:xfrm>
-          <a:prstGeom prst="rect">
-            <a:avLst/>
-          </a:prstGeom>
-          <a:noFill/>
-        </p:spPr>
-        <p:txBody>
-          <a:bodyPr wrap="none" rtlCol="0">
-            <a:spAutoFit/>
-          </a:bodyPr>
-          <a:lstStyle/>
-          <a:p>
-            <a:pPr algn="ctr"/>
-            <a:r>
-              <a:rPr lang="it-IT" sz="800" dirty="0"/>
-              <a:t>Press on </a:t>
-            </a:r>
-            <a:r>
-              <a:rPr lang="it-IT" sz="800" dirty="0" err="1"/>
-              <a:t>contact</a:t>
-            </a:r>
-            <a:r>
-              <a:rPr lang="it-IT" sz="800" dirty="0"/>
-              <a:t> </a:t>
-            </a:r>
-          </a:p>
-          <a:p>
-            <a:pPr algn="ctr"/>
-            <a:r>
-              <a:rPr lang="it-IT" sz="800" dirty="0"/>
-              <a:t>‘</a:t>
-            </a:r>
-            <a:r>
-              <a:rPr lang="it-IT" sz="800" dirty="0" err="1"/>
-              <a:t>Colligo</a:t>
-            </a:r>
-            <a:r>
-              <a:rPr lang="it-IT" sz="800" dirty="0"/>
-              <a:t> Bot’ </a:t>
-            </a:r>
-          </a:p>
-        </p:txBody>
-      </p:sp>
-      <p:sp>
-        <p:nvSpPr>
-          <p:cNvPr id="104" name="CasellaDiTesto 103">
-            <a:extLst>
-              <a:ext uri="{FF2B5EF4-FFF2-40B4-BE49-F238E27FC236}">
-                <a16:creationId xmlns:a16="http://schemas.microsoft.com/office/drawing/2014/main" id="{F9B5BDC1-5A3C-4114-8027-6A369E17FD58}"/>
-              </a:ext>
-            </a:extLst>
-          </p:cNvPr>
-          <p:cNvSpPr txBox="1"/>
-          <p:nvPr/>
-        </p:nvSpPr>
-        <p:spPr>
-          <a:xfrm>
-            <a:off x="1100070" y="4254168"/>
-            <a:ext cx="896399" cy="338554"/>
-          </a:xfrm>
-          <a:prstGeom prst="rect">
-            <a:avLst/>
-          </a:prstGeom>
-          <a:noFill/>
-        </p:spPr>
-        <p:txBody>
-          <a:bodyPr wrap="none" rtlCol="0">
-            <a:spAutoFit/>
-          </a:bodyPr>
-          <a:lstStyle/>
-          <a:p>
-            <a:pPr algn="ctr"/>
-            <a:r>
-              <a:rPr lang="it-IT" sz="800" dirty="0"/>
-              <a:t>Paste and </a:t>
-            </a:r>
-            <a:r>
-              <a:rPr lang="it-IT" sz="800" dirty="0" err="1"/>
-              <a:t>send</a:t>
-            </a:r>
-            <a:endParaRPr lang="it-IT" sz="800" dirty="0"/>
-          </a:p>
-          <a:p>
-            <a:pPr algn="ctr"/>
-            <a:r>
-              <a:rPr lang="it-IT" sz="800" dirty="0"/>
-              <a:t>‘Operator Token’</a:t>
-            </a:r>
-          </a:p>
-        </p:txBody>
-      </p:sp>
-      <p:sp>
-        <p:nvSpPr>
-          <p:cNvPr id="114" name="Titolo 113">
-            <a:extLst>
-              <a:ext uri="{FF2B5EF4-FFF2-40B4-BE49-F238E27FC236}">
-                <a16:creationId xmlns:a16="http://schemas.microsoft.com/office/drawing/2014/main" id="{45C0AF18-60B4-4DD9-BE7C-840BDB44D47C}"/>
-              </a:ext>
-            </a:extLst>
-          </p:cNvPr>
-          <p:cNvSpPr>
-            <a:spLocks noGrp="1"/>
-          </p:cNvSpPr>
-          <p:nvPr>
-            <p:ph type="ctrTitle"/>
-          </p:nvPr>
-        </p:nvSpPr>
-        <p:spPr>
-          <a:xfrm>
-            <a:off x="1247314" y="341787"/>
-            <a:ext cx="9144000" cy="705081"/>
-          </a:xfrm>
-        </p:spPr>
-        <p:txBody>
-          <a:bodyPr>
-            <a:normAutofit/>
-          </a:bodyPr>
-          <a:lstStyle/>
-          <a:p>
-            <a:r>
-              <a:rPr lang="it-IT" sz="4000" dirty="0"/>
-              <a:t>STN Customer: </a:t>
-            </a:r>
-            <a:r>
-              <a:rPr lang="it-IT" sz="4000" dirty="0" err="1"/>
-              <a:t>Registration</a:t>
-            </a:r>
-            <a:endParaRPr lang="it-IT" sz="4000" dirty="0"/>
-          </a:p>
-        </p:txBody>
-      </p:sp>
+      <p:cxnSp>
+        <p:nvCxnSpPr>
+          <p:cNvPr id="38" name="Connettore 2 37">
+            <a:extLst>
+              <a:ext uri="{FF2B5EF4-FFF2-40B4-BE49-F238E27FC236}">
+                <a16:creationId xmlns:a16="http://schemas.microsoft.com/office/drawing/2014/main" id="{1F15F30A-7B89-45B3-8CE2-4C0BB9F826E3}"/>
+              </a:ext>
+            </a:extLst>
+          </p:cNvPr>
+          <p:cNvCxnSpPr>
+            <a:cxnSpLocks/>
+            <a:stCxn id="81" idx="4"/>
+            <a:endCxn id="19" idx="0"/>
+          </p:cNvCxnSpPr>
+          <p:nvPr/>
+        </p:nvCxnSpPr>
+        <p:spPr>
+          <a:xfrm flipH="1">
+            <a:off x="4001042" y="3676173"/>
+            <a:ext cx="453" cy="725876"/>
+          </a:xfrm>
+          <a:prstGeom prst="straightConnector1">
+            <a:avLst/>
+          </a:prstGeom>
+          <a:ln>
+            <a:solidFill>
+              <a:schemeClr val="tx1"/>
+            </a:solidFill>
+            <a:tailEnd type="triangle"/>
+          </a:ln>
+        </p:spPr>
+        <p:style>
+          <a:lnRef idx="1">
+            <a:schemeClr val="accent1"/>
+          </a:lnRef>
+          <a:fillRef idx="0">
+            <a:schemeClr val="accent1"/>
+          </a:fillRef>
+          <a:effectRef idx="0">
+            <a:schemeClr val="accent1"/>
+          </a:effectRef>
+          <a:fontRef idx="minor">
+            <a:schemeClr val="tx1"/>
+          </a:fontRef>
+        </p:style>
+      </p:cxnSp>
+      <p:cxnSp>
+        <p:nvCxnSpPr>
+          <p:cNvPr id="43" name="Connettore 2 42">
+            <a:extLst>
+              <a:ext uri="{FF2B5EF4-FFF2-40B4-BE49-F238E27FC236}">
+                <a16:creationId xmlns:a16="http://schemas.microsoft.com/office/drawing/2014/main" id="{BEEE058B-AB7D-400B-93F0-2082A89637EB}"/>
+              </a:ext>
+            </a:extLst>
+          </p:cNvPr>
+          <p:cNvCxnSpPr>
+            <a:cxnSpLocks/>
+            <a:stCxn id="26" idx="7"/>
+            <a:endCxn id="48" idx="1"/>
+          </p:cNvCxnSpPr>
+          <p:nvPr/>
+        </p:nvCxnSpPr>
+        <p:spPr>
+          <a:xfrm flipV="1">
+            <a:off x="7088548" y="1940882"/>
+            <a:ext cx="1873064" cy="612"/>
+          </a:xfrm>
+          <a:prstGeom prst="straightConnector1">
+            <a:avLst/>
+          </a:prstGeom>
+          <a:ln>
+            <a:solidFill>
+              <a:schemeClr val="tx1"/>
+            </a:solidFill>
+            <a:tailEnd type="triangle"/>
+          </a:ln>
+        </p:spPr>
+        <p:style>
+          <a:lnRef idx="1">
+            <a:schemeClr val="accent1"/>
+          </a:lnRef>
+          <a:fillRef idx="0">
+            <a:schemeClr val="accent1"/>
+          </a:fillRef>
+          <a:effectRef idx="0">
+            <a:schemeClr val="accent1"/>
+          </a:effectRef>
+          <a:fontRef idx="minor">
+            <a:schemeClr val="tx1"/>
+          </a:fontRef>
+        </p:style>
+      </p:cxnSp>
+      <p:cxnSp>
+        <p:nvCxnSpPr>
+          <p:cNvPr id="45" name="Connettore 2 44">
+            <a:extLst>
+              <a:ext uri="{FF2B5EF4-FFF2-40B4-BE49-F238E27FC236}">
+                <a16:creationId xmlns:a16="http://schemas.microsoft.com/office/drawing/2014/main" id="{D01041C5-7D4D-42C0-89C3-DDE20F6DA088}"/>
+              </a:ext>
+            </a:extLst>
+          </p:cNvPr>
+          <p:cNvCxnSpPr>
+            <a:cxnSpLocks/>
+            <a:stCxn id="26" idx="3"/>
+            <a:endCxn id="5" idx="5"/>
+          </p:cNvCxnSpPr>
+          <p:nvPr/>
+        </p:nvCxnSpPr>
+        <p:spPr>
+          <a:xfrm flipH="1">
+            <a:off x="4671840" y="2298286"/>
+            <a:ext cx="1200820" cy="0"/>
+          </a:xfrm>
+          <a:prstGeom prst="straightConnector1">
+            <a:avLst/>
+          </a:prstGeom>
+          <a:ln>
+            <a:solidFill>
+              <a:schemeClr val="tx1"/>
+            </a:solidFill>
+            <a:tailEnd type="triangle"/>
+          </a:ln>
+        </p:spPr>
+        <p:style>
+          <a:lnRef idx="1">
+            <a:schemeClr val="accent1"/>
+          </a:lnRef>
+          <a:fillRef idx="0">
+            <a:schemeClr val="accent1"/>
+          </a:fillRef>
+          <a:effectRef idx="0">
+            <a:schemeClr val="accent1"/>
+          </a:effectRef>
+          <a:fontRef idx="minor">
+            <a:schemeClr val="tx1"/>
+          </a:fontRef>
+        </p:style>
+      </p:cxnSp>
+      <p:cxnSp>
+        <p:nvCxnSpPr>
+          <p:cNvPr id="46" name="Connettore 2 45">
+            <a:extLst>
+              <a:ext uri="{FF2B5EF4-FFF2-40B4-BE49-F238E27FC236}">
+                <a16:creationId xmlns:a16="http://schemas.microsoft.com/office/drawing/2014/main" id="{83C9D88E-19C0-453B-921A-F07B89EE827E}"/>
+              </a:ext>
+            </a:extLst>
+          </p:cNvPr>
+          <p:cNvCxnSpPr>
+            <a:cxnSpLocks/>
+            <a:stCxn id="5" idx="7"/>
+            <a:endCxn id="26" idx="1"/>
+          </p:cNvCxnSpPr>
+          <p:nvPr/>
+        </p:nvCxnSpPr>
+        <p:spPr>
+          <a:xfrm>
+            <a:off x="4671840" y="1941494"/>
+            <a:ext cx="1200820" cy="0"/>
+          </a:xfrm>
+          <a:prstGeom prst="straightConnector1">
+            <a:avLst/>
+          </a:prstGeom>
+          <a:ln>
+            <a:solidFill>
+              <a:schemeClr val="tx1"/>
+            </a:solidFill>
+            <a:tailEnd type="triangle"/>
+          </a:ln>
+        </p:spPr>
+        <p:style>
+          <a:lnRef idx="1">
+            <a:schemeClr val="accent1"/>
+          </a:lnRef>
+          <a:fillRef idx="0">
+            <a:schemeClr val="accent1"/>
+          </a:fillRef>
+          <a:effectRef idx="0">
+            <a:schemeClr val="accent1"/>
+          </a:effectRef>
+          <a:fontRef idx="minor">
+            <a:schemeClr val="tx1"/>
+          </a:fontRef>
+        </p:style>
+      </p:cxnSp>
+      <p:cxnSp>
+        <p:nvCxnSpPr>
+          <p:cNvPr id="68" name="Connettore 2 67">
+            <a:extLst>
+              <a:ext uri="{FF2B5EF4-FFF2-40B4-BE49-F238E27FC236}">
+                <a16:creationId xmlns:a16="http://schemas.microsoft.com/office/drawing/2014/main" id="{461BC9B6-5F4B-402A-B4E0-7DE17B559FED}"/>
+              </a:ext>
+            </a:extLst>
+          </p:cNvPr>
+          <p:cNvCxnSpPr>
+            <a:cxnSpLocks/>
+            <a:stCxn id="48" idx="3"/>
+          </p:cNvCxnSpPr>
+          <p:nvPr/>
+        </p:nvCxnSpPr>
+        <p:spPr>
+          <a:xfrm flipH="1">
+            <a:off x="6914536" y="2297674"/>
+            <a:ext cx="2047076" cy="20991"/>
+          </a:xfrm>
+          <a:prstGeom prst="straightConnector1">
+            <a:avLst/>
+          </a:prstGeom>
+          <a:ln>
+            <a:solidFill>
+              <a:schemeClr val="tx1"/>
+            </a:solidFill>
+            <a:tailEnd type="triangle"/>
+          </a:ln>
+        </p:spPr>
+        <p:style>
+          <a:lnRef idx="1">
+            <a:schemeClr val="accent1"/>
+          </a:lnRef>
+          <a:fillRef idx="0">
+            <a:schemeClr val="accent1"/>
+          </a:fillRef>
+          <a:effectRef idx="0">
+            <a:schemeClr val="accent1"/>
+          </a:effectRef>
+          <a:fontRef idx="minor">
+            <a:schemeClr val="tx1"/>
+          </a:fontRef>
+        </p:style>
+      </p:cxnSp>
     </p:spTree>
     <p:extLst>
       <p:ext uri="{BB962C8B-B14F-4D97-AF65-F5344CB8AC3E}">
@@ -8798,8 +8382,8 @@
         </p:nvSpPr>
         <p:spPr>
           <a:xfrm>
-            <a:off x="5289241" y="5736808"/>
-            <a:ext cx="1297642" cy="779405"/>
+            <a:off x="3060244" y="5524735"/>
+            <a:ext cx="1088393" cy="542373"/>
           </a:xfrm>
           <a:prstGeom prst="ellipse">
             <a:avLst/>
@@ -8852,8 +8436,8 @@
         </p:nvSpPr>
         <p:spPr>
           <a:xfrm>
-            <a:off x="3474439" y="1867599"/>
-            <a:ext cx="2087462" cy="640709"/>
+            <a:off x="2685276" y="1852776"/>
+            <a:ext cx="1750851" cy="445857"/>
           </a:xfrm>
           <a:prstGeom prst="ellipse">
             <a:avLst/>
@@ -8889,28 +8473,12 @@
           <a:p>
             <a:pPr algn="ctr"/>
             <a:r>
-              <a:rPr lang="it-IT" dirty="0">
+              <a:rPr lang="it-IT" sz="1200" dirty="0">
                 <a:solidFill>
                   <a:schemeClr val="tx1"/>
                 </a:solidFill>
               </a:rPr>
-              <a:t>Browsing the </a:t>
-            </a:r>
-            <a:r>
-              <a:rPr lang="it-IT" dirty="0" err="1">
-                <a:solidFill>
-                  <a:schemeClr val="tx1"/>
-                </a:solidFill>
-              </a:rPr>
-              <a:t>categories</a:t>
-            </a:r>
-            <a:r>
-              <a:rPr lang="it-IT" dirty="0">
-                <a:solidFill>
-                  <a:schemeClr val="tx1"/>
-                </a:solidFill>
-              </a:rPr>
-              <a:t> list</a:t>
+              <a:t>Browsing the categories list</a:t>
             </a:r>
           </a:p>
         </p:txBody>
@@ -8930,7 +8498,7 @@
         <p:spPr>
           <a:xfrm>
             <a:off x="1023458" y="1867599"/>
-            <a:ext cx="1132514" cy="640709"/>
+            <a:ext cx="949892" cy="445857"/>
           </a:xfrm>
           <a:prstGeom prst="ellipse">
             <a:avLst/>
@@ -8983,8 +8551,8 @@
         </p:nvSpPr>
         <p:spPr>
           <a:xfrm>
-            <a:off x="1098955" y="1923699"/>
-            <a:ext cx="989901" cy="528507"/>
+            <a:off x="1083266" y="1906638"/>
+            <a:ext cx="830276" cy="367778"/>
           </a:xfrm>
           <a:prstGeom prst="ellipse">
             <a:avLst/>
@@ -9020,62 +8588,21 @@
           <a:p>
             <a:pPr algn="ctr"/>
             <a:r>
-              <a:rPr lang="it-IT" dirty="0">
+              <a:rPr lang="it-IT" sz="1400" b="1" dirty="0">
                 <a:solidFill>
                   <a:schemeClr val="tx1"/>
                 </a:solidFill>
               </a:rPr>
               <a:t>Start</a:t>
             </a:r>
-          </a:p>
-        </p:txBody>
-      </p:sp>
-      <p:cxnSp>
-        <p:nvCxnSpPr>
-          <p:cNvPr id="8" name="Connettore curvo 7">
-            <a:extLst>
-              <a:ext uri="{FF2B5EF4-FFF2-40B4-BE49-F238E27FC236}">
-                <a16:creationId xmlns:a16="http://schemas.microsoft.com/office/drawing/2014/main" id="{12BDE4A9-D037-4749-BD81-B5CCC19F77CA}"/>
-              </a:ext>
-            </a:extLst>
-          </p:cNvPr>
-          <p:cNvCxnSpPr>
-            <a:cxnSpLocks/>
-          </p:cNvCxnSpPr>
-          <p:nvPr/>
-        </p:nvCxnSpPr>
-        <p:spPr>
-          <a:xfrm rot="5400000" flipH="1" flipV="1">
-            <a:off x="2885130" y="1066418"/>
-            <a:ext cx="12700" cy="1790022"/>
-          </a:xfrm>
-          <a:prstGeom prst="curvedConnector3">
-            <a:avLst>
-              <a:gd name="adj1" fmla="val 2538819"/>
-            </a:avLst>
-          </a:prstGeom>
-          <a:ln>
-            <a:solidFill>
-              <a:schemeClr val="tx1"/>
-            </a:solidFill>
-            <a:tailEnd type="triangle"/>
-          </a:ln>
-        </p:spPr>
-        <p:style>
-          <a:lnRef idx="1">
-            <a:schemeClr val="accent1"/>
-          </a:lnRef>
-          <a:fillRef idx="0">
-            <a:schemeClr val="accent1"/>
-          </a:fillRef>
-          <a:effectRef idx="0">
-            <a:schemeClr val="accent1"/>
-          </a:effectRef>
-          <a:fontRef idx="minor">
-            <a:schemeClr val="tx1"/>
-          </a:fontRef>
-        </p:style>
-      </p:cxnSp>
+            <a:endParaRPr lang="it-IT" b="1" dirty="0">
+              <a:solidFill>
+                <a:schemeClr val="tx1"/>
+              </a:solidFill>
+            </a:endParaRPr>
+          </a:p>
+        </p:txBody>
+      </p:sp>
       <p:sp>
         <p:nvSpPr>
           <p:cNvPr id="18" name="CasellaDiTesto 17">
@@ -9091,7 +8618,7 @@
         <p:spPr>
           <a:xfrm>
             <a:off x="2181622" y="1284939"/>
-            <a:ext cx="1200970" cy="338554"/>
+            <a:ext cx="1007309" cy="461665"/>
           </a:xfrm>
           <a:prstGeom prst="rect">
             <a:avLst/>
@@ -9099,7 +8626,7 @@
           <a:noFill/>
         </p:spPr>
         <p:txBody>
-          <a:bodyPr wrap="none" rtlCol="0">
+          <a:bodyPr wrap="square" rtlCol="0">
             <a:spAutoFit/>
           </a:bodyPr>
           <a:lstStyle/>
@@ -9122,13 +8649,8 @@
             <a:pPr algn="ctr"/>
             <a:r>
               <a:rPr lang="it-IT" sz="800" dirty="0"/>
-              <a:t>shopping basket’ </a:t>
-            </a:r>
-            <a:r>
-              <a:rPr lang="it-IT" sz="800" dirty="0" err="1"/>
-              <a:t>button</a:t>
-            </a:r>
-            <a:endParaRPr lang="it-IT" sz="800" dirty="0"/>
+              <a:t>shopping basket’ button</a:t>
+            </a:r>
           </a:p>
         </p:txBody>
       </p:sp>
@@ -9146,8 +8668,8 @@
         </p:nvSpPr>
         <p:spPr>
           <a:xfrm>
-            <a:off x="7099881" y="1867599"/>
-            <a:ext cx="2087462" cy="640709"/>
+            <a:off x="5502208" y="1825609"/>
+            <a:ext cx="1750851" cy="445857"/>
           </a:xfrm>
           <a:prstGeom prst="ellipse">
             <a:avLst/>
@@ -9183,78 +8705,16 @@
           <a:p>
             <a:pPr algn="ctr"/>
             <a:r>
-              <a:rPr lang="it-IT" dirty="0">
+              <a:rPr lang="it-IT" sz="1200" dirty="0">
                 <a:solidFill>
                   <a:schemeClr val="tx1"/>
                 </a:solidFill>
               </a:rPr>
-              <a:t>Browsing the </a:t>
-            </a:r>
-            <a:r>
-              <a:rPr lang="it-IT" dirty="0" err="1">
-                <a:solidFill>
-                  <a:schemeClr val="tx1"/>
-                </a:solidFill>
-              </a:rPr>
-              <a:t>foodstuffs</a:t>
-            </a:r>
-            <a:r>
-              <a:rPr lang="it-IT" dirty="0">
-                <a:solidFill>
-                  <a:schemeClr val="tx1"/>
-                </a:solidFill>
-              </a:rPr>
-              <a:t> list</a:t>
-            </a:r>
-          </a:p>
-        </p:txBody>
-      </p:sp>
-      <p:cxnSp>
-        <p:nvCxnSpPr>
-          <p:cNvPr id="44" name="Connettore curvo 43">
-            <a:extLst>
-              <a:ext uri="{FF2B5EF4-FFF2-40B4-BE49-F238E27FC236}">
-                <a16:creationId xmlns:a16="http://schemas.microsoft.com/office/drawing/2014/main" id="{5131291F-4DFE-4CD7-922B-EB463A708A09}"/>
-              </a:ext>
-            </a:extLst>
-          </p:cNvPr>
-          <p:cNvCxnSpPr>
-            <a:cxnSpLocks/>
-          </p:cNvCxnSpPr>
-          <p:nvPr/>
-        </p:nvCxnSpPr>
-        <p:spPr>
-          <a:xfrm rot="5400000" flipH="1" flipV="1">
-            <a:off x="6330891" y="886737"/>
-            <a:ext cx="12700" cy="2149384"/>
-          </a:xfrm>
-          <a:prstGeom prst="curvedConnector3">
-            <a:avLst>
-              <a:gd name="adj1" fmla="val 2538819"/>
-            </a:avLst>
-          </a:prstGeom>
-          <a:ln>
-            <a:solidFill>
-              <a:schemeClr val="tx1"/>
-            </a:solidFill>
-            <a:tailEnd type="triangle"/>
-          </a:ln>
-        </p:spPr>
-        <p:style>
-          <a:lnRef idx="1">
-            <a:schemeClr val="accent1"/>
-          </a:lnRef>
-          <a:fillRef idx="0">
-            <a:schemeClr val="accent1"/>
-          </a:fillRef>
-          <a:effectRef idx="0">
-            <a:schemeClr val="accent1"/>
-          </a:effectRef>
-          <a:fontRef idx="minor">
-            <a:schemeClr val="tx1"/>
-          </a:fontRef>
-        </p:style>
-      </p:cxnSp>
+              <a:t>Browsing the foodstuffs list</a:t>
+            </a:r>
+          </a:p>
+        </p:txBody>
+      </p:sp>
       <p:sp>
         <p:nvSpPr>
           <p:cNvPr id="47" name="CasellaDiTesto 46">
@@ -9269,8 +8729,8 @@
         </p:nvSpPr>
         <p:spPr>
           <a:xfrm>
-            <a:off x="5819314" y="1284939"/>
-            <a:ext cx="1035861" cy="338554"/>
+            <a:off x="4436127" y="1621943"/>
+            <a:ext cx="1007309" cy="338554"/>
           </a:xfrm>
           <a:prstGeom prst="rect">
             <a:avLst/>
@@ -9278,7 +8738,7 @@
           <a:noFill/>
         </p:spPr>
         <p:txBody>
-          <a:bodyPr wrap="none" rtlCol="0">
+          <a:bodyPr wrap="square" rtlCol="0">
             <a:spAutoFit/>
           </a:bodyPr>
           <a:lstStyle/>
@@ -9286,32 +8746,23 @@
             <a:pPr algn="ctr"/>
             <a:r>
               <a:rPr lang="it-IT" sz="800" dirty="0"/>
-              <a:t>Press the ’</a:t>
+              <a:t>Press the </a:t>
             </a:r>
             <a:r>
               <a:rPr lang="it-IT" sz="800" dirty="0" err="1"/>
-              <a:t>Category</a:t>
-            </a:r>
-            <a:r>
-              <a:rPr lang="it-IT" sz="800" dirty="0"/>
-              <a:t>’ </a:t>
-            </a:r>
-          </a:p>
-          <a:p>
-            <a:pPr algn="ctr"/>
-            <a:r>
-              <a:rPr lang="it-IT" sz="800" dirty="0" err="1"/>
-              <a:t>choosen</a:t>
+              <a:t>category</a:t>
             </a:r>
             <a:r>
               <a:rPr lang="it-IT" sz="800" dirty="0"/>
               <a:t> </a:t>
             </a:r>
-            <a:r>
-              <a:rPr lang="it-IT" sz="800" dirty="0" err="1"/>
-              <a:t>button</a:t>
-            </a:r>
-            <a:endParaRPr lang="it-IT" sz="800" dirty="0"/>
+          </a:p>
+          <a:p>
+            <a:pPr algn="ctr"/>
+            <a:r>
+              <a:rPr lang="it-IT" sz="800" dirty="0"/>
+              <a:t>choosen button</a:t>
+            </a:r>
           </a:p>
         </p:txBody>
       </p:sp>
@@ -9329,8 +8780,8 @@
         </p:nvSpPr>
         <p:spPr>
           <a:xfrm>
-            <a:off x="8590915" y="4486870"/>
-            <a:ext cx="2229705" cy="640709"/>
+            <a:off x="8571645" y="1825608"/>
+            <a:ext cx="1870157" cy="445857"/>
           </a:xfrm>
           <a:prstGeom prst="ellipse">
             <a:avLst/>
@@ -9366,76 +8817,16 @@
           <a:p>
             <a:pPr algn="ctr"/>
             <a:r>
-              <a:rPr lang="it-IT" dirty="0">
+              <a:rPr lang="it-IT" sz="1200" dirty="0">
                 <a:solidFill>
                   <a:schemeClr val="tx1"/>
                 </a:solidFill>
               </a:rPr>
-              <a:t>Write the </a:t>
-            </a:r>
-            <a:r>
-              <a:rPr lang="it-IT" dirty="0" err="1">
-                <a:solidFill>
-                  <a:schemeClr val="tx1"/>
-                </a:solidFill>
-              </a:rPr>
-              <a:t>foodstuff</a:t>
-            </a:r>
-            <a:r>
-              <a:rPr lang="it-IT" dirty="0">
-                <a:solidFill>
-                  <a:schemeClr val="tx1"/>
-                </a:solidFill>
-              </a:rPr>
-              <a:t> price</a:t>
-            </a:r>
-          </a:p>
-        </p:txBody>
-      </p:sp>
-      <p:cxnSp>
-        <p:nvCxnSpPr>
-          <p:cNvPr id="50" name="Connettore curvo 49">
-            <a:extLst>
-              <a:ext uri="{FF2B5EF4-FFF2-40B4-BE49-F238E27FC236}">
-                <a16:creationId xmlns:a16="http://schemas.microsoft.com/office/drawing/2014/main" id="{90B90F0C-5409-4B6C-A890-A1B1BA35E656}"/>
-              </a:ext>
-            </a:extLst>
-          </p:cNvPr>
-          <p:cNvCxnSpPr>
-            <a:cxnSpLocks/>
-          </p:cNvCxnSpPr>
-          <p:nvPr/>
-        </p:nvCxnSpPr>
-        <p:spPr>
-          <a:xfrm>
-            <a:off x="9187343" y="2187954"/>
-            <a:ext cx="1306744" cy="2392746"/>
-          </a:xfrm>
-          <a:prstGeom prst="curvedConnector2">
-            <a:avLst/>
-          </a:prstGeom>
-          <a:ln>
-            <a:solidFill>
-              <a:schemeClr val="tx1"/>
-            </a:solidFill>
-            <a:tailEnd type="triangle"/>
-          </a:ln>
-        </p:spPr>
-        <p:style>
-          <a:lnRef idx="1">
-            <a:schemeClr val="accent1"/>
-          </a:lnRef>
-          <a:fillRef idx="0">
-            <a:schemeClr val="accent1"/>
-          </a:fillRef>
-          <a:effectRef idx="0">
-            <a:schemeClr val="accent1"/>
-          </a:effectRef>
-          <a:fontRef idx="minor">
-            <a:schemeClr val="tx1"/>
-          </a:fontRef>
-        </p:style>
-      </p:cxnSp>
+              <a:t>Write the foodstuff price</a:t>
+            </a:r>
+          </a:p>
+        </p:txBody>
+      </p:sp>
       <p:sp>
         <p:nvSpPr>
           <p:cNvPr id="56" name="CasellaDiTesto 55">
@@ -9450,8 +8841,8 @@
         </p:nvSpPr>
         <p:spPr>
           <a:xfrm>
-            <a:off x="10266695" y="3215050"/>
-            <a:ext cx="1024639" cy="338554"/>
+            <a:off x="7408697" y="1607925"/>
+            <a:ext cx="1007309" cy="338554"/>
           </a:xfrm>
           <a:prstGeom prst="rect">
             <a:avLst/>
@@ -9459,81 +8850,26 @@
           <a:noFill/>
         </p:spPr>
         <p:txBody>
-          <a:bodyPr wrap="none" rtlCol="0">
+          <a:bodyPr wrap="square" rtlCol="0">
             <a:spAutoFit/>
           </a:bodyPr>
           <a:lstStyle/>
           <a:p>
             <a:pPr algn="ctr"/>
             <a:r>
-              <a:rPr lang="it-IT" sz="800" dirty="0"/>
-              <a:t>Press the ‘</a:t>
-            </a:r>
-            <a:r>
-              <a:rPr lang="it-IT" sz="800" dirty="0" err="1"/>
-              <a:t>Foodtuff</a:t>
-            </a:r>
-            <a:r>
-              <a:rPr lang="it-IT" sz="800" dirty="0"/>
-              <a:t>’ </a:t>
-            </a:r>
-          </a:p>
-          <a:p>
-            <a:pPr algn="ctr"/>
-            <a:r>
-              <a:rPr lang="it-IT" sz="800" dirty="0" err="1"/>
+              <a:rPr lang="it-IT" sz="800" u="sng" dirty="0"/>
+              <a:t>Press the ‘Foodtuff’ </a:t>
+            </a:r>
+          </a:p>
+          <a:p>
+            <a:pPr algn="ctr"/>
+            <a:r>
+              <a:rPr lang="it-IT" sz="800" u="sng" dirty="0"/>
               <a:t>button</a:t>
             </a:r>
-            <a:endParaRPr lang="it-IT" sz="800" dirty="0"/>
-          </a:p>
-        </p:txBody>
-      </p:sp>
-      <p:cxnSp>
-        <p:nvCxnSpPr>
-          <p:cNvPr id="72" name="Connettore curvo 71">
-            <a:extLst>
-              <a:ext uri="{FF2B5EF4-FFF2-40B4-BE49-F238E27FC236}">
-                <a16:creationId xmlns:a16="http://schemas.microsoft.com/office/drawing/2014/main" id="{C8F10790-2840-4BE1-8DB4-B5E8D4E712C6}"/>
-              </a:ext>
-            </a:extLst>
-          </p:cNvPr>
-          <p:cNvCxnSpPr>
-            <a:cxnSpLocks/>
-          </p:cNvCxnSpPr>
-          <p:nvPr/>
-        </p:nvCxnSpPr>
-        <p:spPr>
-          <a:xfrm rot="16200000" flipV="1">
-            <a:off x="7078405" y="2741656"/>
-            <a:ext cx="2166222" cy="1511865"/>
-          </a:xfrm>
-          <a:prstGeom prst="curvedConnector3">
-            <a:avLst>
-              <a:gd name="adj1" fmla="val 50000"/>
-            </a:avLst>
-          </a:prstGeom>
-          <a:ln>
-            <a:solidFill>
-              <a:schemeClr val="tx1"/>
-            </a:solidFill>
-            <a:tailEnd type="triangle"/>
-          </a:ln>
-        </p:spPr>
-        <p:style>
-          <a:lnRef idx="1">
-            <a:schemeClr val="accent1"/>
-          </a:lnRef>
-          <a:fillRef idx="0">
-            <a:schemeClr val="accent1"/>
-          </a:fillRef>
-          <a:effectRef idx="0">
-            <a:schemeClr val="accent1"/>
-          </a:effectRef>
-          <a:fontRef idx="minor">
-            <a:schemeClr val="tx1"/>
-          </a:fontRef>
-        </p:style>
-      </p:cxnSp>
+          </a:p>
+        </p:txBody>
+      </p:sp>
       <p:sp>
         <p:nvSpPr>
           <p:cNvPr id="73" name="CasellaDiTesto 72">
@@ -9548,8 +8884,8 @@
         </p:nvSpPr>
         <p:spPr>
           <a:xfrm>
-            <a:off x="8186454" y="3215050"/>
-            <a:ext cx="877163" cy="338554"/>
+            <a:off x="7323417" y="2183647"/>
+            <a:ext cx="949891" cy="338554"/>
           </a:xfrm>
           <a:prstGeom prst="rect">
             <a:avLst/>
@@ -9557,7 +8893,7 @@
           <a:noFill/>
         </p:spPr>
         <p:txBody>
-          <a:bodyPr wrap="none" rtlCol="0">
+          <a:bodyPr wrap="square" rtlCol="0">
             <a:spAutoFit/>
           </a:bodyPr>
           <a:lstStyle/>
@@ -9565,82 +8901,18 @@
             <a:pPr algn="ctr"/>
             <a:r>
               <a:rPr lang="it-IT" sz="800" dirty="0"/>
-              <a:t>Press the ‘</a:t>
-            </a:r>
-            <a:r>
-              <a:rPr lang="it-IT" sz="800" dirty="0" err="1"/>
-              <a:t>Add</a:t>
-            </a:r>
+              <a:t>Press the ‘Add </a:t>
+            </a:r>
+          </a:p>
+          <a:p>
+            <a:pPr algn="ctr"/>
             <a:r>
               <a:rPr lang="it-IT" sz="800" dirty="0"/>
-              <a:t> </a:t>
-            </a:r>
-          </a:p>
-          <a:p>
-            <a:pPr algn="ctr"/>
-            <a:r>
-              <a:rPr lang="it-IT" sz="800" dirty="0" err="1"/>
-              <a:t>Foodtuff</a:t>
-            </a:r>
-            <a:r>
-              <a:rPr lang="it-IT" sz="800" dirty="0"/>
-              <a:t>’ </a:t>
-            </a:r>
-            <a:r>
-              <a:rPr lang="it-IT" sz="800" dirty="0" err="1"/>
-              <a:t>button</a:t>
-            </a:r>
-            <a:endParaRPr lang="it-IT" sz="800" dirty="0"/>
-          </a:p>
-        </p:txBody>
-      </p:sp>
-      <p:cxnSp>
-        <p:nvCxnSpPr>
-          <p:cNvPr id="75" name="Connettore curvo 74">
-            <a:extLst>
-              <a:ext uri="{FF2B5EF4-FFF2-40B4-BE49-F238E27FC236}">
-                <a16:creationId xmlns:a16="http://schemas.microsoft.com/office/drawing/2014/main" id="{76600392-183A-445A-A0C6-4E8EED389736}"/>
-              </a:ext>
-            </a:extLst>
-          </p:cNvPr>
-          <p:cNvCxnSpPr>
-            <a:cxnSpLocks/>
-          </p:cNvCxnSpPr>
-          <p:nvPr/>
-        </p:nvCxnSpPr>
-        <p:spPr>
-          <a:xfrm rot="10800000" flipV="1">
-            <a:off x="5256199" y="2187954"/>
-            <a:ext cx="1843682" cy="226524"/>
-          </a:xfrm>
-          <a:prstGeom prst="curvedConnector4">
-            <a:avLst>
-              <a:gd name="adj1" fmla="val 41709"/>
-              <a:gd name="adj2" fmla="val 242338"/>
-            </a:avLst>
-          </a:prstGeom>
-          <a:ln>
-            <a:solidFill>
-              <a:schemeClr val="tx1"/>
-            </a:solidFill>
-            <a:tailEnd type="triangle"/>
-          </a:ln>
-        </p:spPr>
-        <p:style>
-          <a:lnRef idx="1">
-            <a:schemeClr val="accent1"/>
-          </a:lnRef>
-          <a:fillRef idx="0">
-            <a:schemeClr val="accent1"/>
-          </a:fillRef>
-          <a:effectRef idx="0">
-            <a:schemeClr val="accent1"/>
-          </a:effectRef>
-          <a:fontRef idx="minor">
-            <a:schemeClr val="tx1"/>
-          </a:fontRef>
-        </p:style>
-      </p:cxnSp>
+              <a:t>Foodtuff’ button</a:t>
+            </a:r>
+          </a:p>
+        </p:txBody>
+      </p:sp>
       <p:sp>
         <p:nvSpPr>
           <p:cNvPr id="80" name="CasellaDiTesto 79">
@@ -9655,8 +8927,8 @@
         </p:nvSpPr>
         <p:spPr>
           <a:xfrm>
-            <a:off x="5396525" y="2734832"/>
-            <a:ext cx="906017" cy="338554"/>
+            <a:off x="4436126" y="2164472"/>
+            <a:ext cx="949891" cy="338554"/>
           </a:xfrm>
           <a:prstGeom prst="rect">
             <a:avLst/>
@@ -9664,7 +8936,7 @@
           <a:noFill/>
         </p:spPr>
         <p:txBody>
-          <a:bodyPr wrap="none" rtlCol="0">
+          <a:bodyPr wrap="square" rtlCol="0">
             <a:spAutoFit/>
           </a:bodyPr>
           <a:lstStyle/>
@@ -9678,10 +8950,9 @@
           <a:p>
             <a:pPr algn="ctr"/>
             <a:r>
-              <a:rPr lang="it-IT" sz="800" dirty="0" err="1"/>
+              <a:rPr lang="it-IT" sz="800" dirty="0"/>
               <a:t>button</a:t>
             </a:r>
-            <a:endParaRPr lang="it-IT" sz="800" dirty="0"/>
           </a:p>
         </p:txBody>
       </p:sp>
@@ -9699,8 +8970,8 @@
         </p:nvSpPr>
         <p:spPr>
           <a:xfrm>
-            <a:off x="3499562" y="4121967"/>
-            <a:ext cx="2406288" cy="640709"/>
+            <a:off x="2687213" y="4113511"/>
+            <a:ext cx="1834453" cy="445857"/>
           </a:xfrm>
           <a:prstGeom prst="ellipse">
             <a:avLst/>
@@ -9736,26 +9007,13 @@
           <a:p>
             <a:pPr algn="ctr"/>
             <a:r>
-              <a:rPr lang="it-IT" dirty="0">
+              <a:rPr lang="it-IT" sz="1200" dirty="0">
                 <a:solidFill>
                   <a:schemeClr val="tx1"/>
                 </a:solidFill>
               </a:rPr>
-              <a:t>Shopping basket </a:t>
-            </a:r>
-            <a:r>
-              <a:rPr lang="it-IT" dirty="0" err="1">
-                <a:solidFill>
-                  <a:schemeClr val="tx1"/>
-                </a:solidFill>
-              </a:rPr>
-              <a:t>overview</a:t>
-            </a:r>
-            <a:endParaRPr lang="it-IT" dirty="0">
-              <a:solidFill>
-                <a:schemeClr val="tx1"/>
-              </a:solidFill>
-            </a:endParaRPr>
+              <a:t>Shopping basket overview</a:t>
+            </a:r>
           </a:p>
         </p:txBody>
       </p:sp>
@@ -9773,8 +9031,8 @@
         </p:nvSpPr>
         <p:spPr>
           <a:xfrm>
-            <a:off x="5336710" y="5814145"/>
-            <a:ext cx="1202704" cy="636203"/>
+            <a:off x="3100058" y="5573061"/>
+            <a:ext cx="1008764" cy="442721"/>
           </a:xfrm>
           <a:prstGeom prst="ellipse">
             <a:avLst/>
@@ -9810,7 +9068,7 @@
           <a:p>
             <a:pPr algn="ctr"/>
             <a:r>
-              <a:rPr lang="it-IT" dirty="0">
+              <a:rPr lang="it-IT" sz="1400" b="1" dirty="0">
                 <a:solidFill>
                   <a:schemeClr val="tx1"/>
                 </a:solidFill>
@@ -9820,26 +9078,148 @@
           </a:p>
         </p:txBody>
       </p:sp>
+      <p:sp>
+        <p:nvSpPr>
+          <p:cNvPr id="103" name="CasellaDiTesto 102">
+            <a:extLst>
+              <a:ext uri="{FF2B5EF4-FFF2-40B4-BE49-F238E27FC236}">
+                <a16:creationId xmlns:a16="http://schemas.microsoft.com/office/drawing/2014/main" id="{C89F1172-5825-4FAB-A83D-3714FA7EF00F}"/>
+              </a:ext>
+            </a:extLst>
+          </p:cNvPr>
+          <p:cNvSpPr txBox="1"/>
+          <p:nvPr/>
+        </p:nvSpPr>
+        <p:spPr>
+          <a:xfrm>
+            <a:off x="2637534" y="2935264"/>
+            <a:ext cx="1029254" cy="338554"/>
+          </a:xfrm>
+          <a:prstGeom prst="rect">
+            <a:avLst/>
+          </a:prstGeom>
+          <a:noFill/>
+        </p:spPr>
+        <p:txBody>
+          <a:bodyPr wrap="square" rtlCol="0">
+            <a:spAutoFit/>
+          </a:bodyPr>
+          <a:lstStyle/>
+          <a:p>
+            <a:pPr algn="ctr"/>
+            <a:r>
+              <a:rPr lang="it-IT" sz="800" dirty="0"/>
+              <a:t>Press the ‘Shopping </a:t>
+            </a:r>
+          </a:p>
+          <a:p>
+            <a:pPr algn="ctr"/>
+            <a:r>
+              <a:rPr lang="it-IT" sz="800" dirty="0"/>
+              <a:t>basket’ button</a:t>
+            </a:r>
+          </a:p>
+        </p:txBody>
+      </p:sp>
+      <p:sp>
+        <p:nvSpPr>
+          <p:cNvPr id="104" name="CasellaDiTesto 103">
+            <a:extLst>
+              <a:ext uri="{FF2B5EF4-FFF2-40B4-BE49-F238E27FC236}">
+                <a16:creationId xmlns:a16="http://schemas.microsoft.com/office/drawing/2014/main" id="{F9B5BDC1-5A3C-4114-8027-6A369E17FD58}"/>
+              </a:ext>
+            </a:extLst>
+          </p:cNvPr>
+          <p:cNvSpPr txBox="1"/>
+          <p:nvPr/>
+        </p:nvSpPr>
+        <p:spPr>
+          <a:xfrm>
+            <a:off x="2685277" y="4750142"/>
+            <a:ext cx="981502" cy="338554"/>
+          </a:xfrm>
+          <a:prstGeom prst="rect">
+            <a:avLst/>
+          </a:prstGeom>
+          <a:noFill/>
+        </p:spPr>
+        <p:txBody>
+          <a:bodyPr wrap="square" rtlCol="0">
+            <a:spAutoFit/>
+          </a:bodyPr>
+          <a:lstStyle/>
+          <a:p>
+            <a:pPr algn="ctr"/>
+            <a:r>
+              <a:rPr lang="it-IT" sz="800" dirty="0"/>
+              <a:t>Press the ‘Send the </a:t>
+            </a:r>
+          </a:p>
+          <a:p>
+            <a:pPr algn="ctr"/>
+            <a:r>
+              <a:rPr lang="it-IT" sz="800" dirty="0"/>
+              <a:t>order’ button</a:t>
+            </a:r>
+          </a:p>
+        </p:txBody>
+      </p:sp>
+      <p:sp>
+        <p:nvSpPr>
+          <p:cNvPr id="114" name="Titolo 113">
+            <a:extLst>
+              <a:ext uri="{FF2B5EF4-FFF2-40B4-BE49-F238E27FC236}">
+                <a16:creationId xmlns:a16="http://schemas.microsoft.com/office/drawing/2014/main" id="{45C0AF18-60B4-4DD9-BE7C-840BDB44D47C}"/>
+              </a:ext>
+            </a:extLst>
+          </p:cNvPr>
+          <p:cNvSpPr>
+            <a:spLocks noGrp="1"/>
+          </p:cNvSpPr>
+          <p:nvPr>
+            <p:ph type="ctrTitle"/>
+          </p:nvPr>
+        </p:nvSpPr>
+        <p:spPr>
+          <a:xfrm>
+            <a:off x="1247314" y="341787"/>
+            <a:ext cx="9144000" cy="705081"/>
+          </a:xfrm>
+        </p:spPr>
+        <p:txBody>
+          <a:bodyPr>
+            <a:normAutofit/>
+          </a:bodyPr>
+          <a:lstStyle/>
+          <a:p>
+            <a:r>
+              <a:rPr lang="it-IT" sz="4000" dirty="0"/>
+              <a:t>STN Customer: Fill shopping basket</a:t>
+            </a:r>
+          </a:p>
+        </p:txBody>
+      </p:sp>
       <p:cxnSp>
         <p:nvCxnSpPr>
-          <p:cNvPr id="85" name="Connettore curvo 84">
-            <a:extLst>
-              <a:ext uri="{FF2B5EF4-FFF2-40B4-BE49-F238E27FC236}">
-                <a16:creationId xmlns:a16="http://schemas.microsoft.com/office/drawing/2014/main" id="{850F41A3-14DD-4078-9229-F86C8C9E865F}"/>
+          <p:cNvPr id="22" name="Connettore 2 21">
+            <a:extLst>
+              <a:ext uri="{FF2B5EF4-FFF2-40B4-BE49-F238E27FC236}">
+                <a16:creationId xmlns:a16="http://schemas.microsoft.com/office/drawing/2014/main" id="{78299486-2E70-4F1C-8838-B5A7B77638A9}"/>
               </a:ext>
             </a:extLst>
           </p:cNvPr>
           <p:cNvCxnSpPr>
-            <a:cxnSpLocks/>
+            <a:stCxn id="6" idx="7"/>
+            <a:endCxn id="5" idx="1"/>
           </p:cNvCxnSpPr>
           <p:nvPr/>
         </p:nvCxnSpPr>
         <p:spPr>
-          <a:xfrm rot="5400000">
-            <a:off x="3318389" y="3016015"/>
-            <a:ext cx="1707489" cy="692075"/>
-          </a:xfrm>
-          <a:prstGeom prst="curvedConnector3">
+          <a:xfrm flipV="1">
+            <a:off x="1834242" y="1918070"/>
+            <a:ext cx="1107440" cy="14823"/>
+          </a:xfrm>
+          <a:prstGeom prst="straightConnector1">
             <a:avLst/>
           </a:prstGeom>
           <a:ln>
@@ -9866,24 +9246,26 @@
       </p:cxnSp>
       <p:cxnSp>
         <p:nvCxnSpPr>
-          <p:cNvPr id="96" name="Connettore curvo 95">
-            <a:extLst>
-              <a:ext uri="{FF2B5EF4-FFF2-40B4-BE49-F238E27FC236}">
-                <a16:creationId xmlns:a16="http://schemas.microsoft.com/office/drawing/2014/main" id="{BEAF9AA5-3C2A-454F-A409-A9DB514B7898}"/>
+          <p:cNvPr id="40" name="Connettore 2 39">
+            <a:extLst>
+              <a:ext uri="{FF2B5EF4-FFF2-40B4-BE49-F238E27FC236}">
+                <a16:creationId xmlns:a16="http://schemas.microsoft.com/office/drawing/2014/main" id="{5E9EDFBD-A9DA-4246-8063-4C7A2936A68E}"/>
               </a:ext>
             </a:extLst>
           </p:cNvPr>
           <p:cNvCxnSpPr>
             <a:cxnSpLocks/>
+            <a:stCxn id="5" idx="7"/>
+            <a:endCxn id="26" idx="1"/>
           </p:cNvCxnSpPr>
           <p:nvPr/>
         </p:nvCxnSpPr>
         <p:spPr>
-          <a:xfrm rot="16200000" flipH="1">
-            <a:off x="3850755" y="4644186"/>
-            <a:ext cx="1387136" cy="1436456"/>
-          </a:xfrm>
-          <a:prstGeom prst="curvedConnector2">
+          <a:xfrm flipV="1">
+            <a:off x="4179721" y="1890903"/>
+            <a:ext cx="1578893" cy="27167"/>
+          </a:xfrm>
+          <a:prstGeom prst="straightConnector1">
             <a:avLst/>
           </a:prstGeom>
           <a:ln>
@@ -9908,157 +9290,236 @@
           </a:fontRef>
         </p:style>
       </p:cxnSp>
-      <p:sp>
-        <p:nvSpPr>
-          <p:cNvPr id="103" name="CasellaDiTesto 102">
-            <a:extLst>
-              <a:ext uri="{FF2B5EF4-FFF2-40B4-BE49-F238E27FC236}">
-                <a16:creationId xmlns:a16="http://schemas.microsoft.com/office/drawing/2014/main" id="{C89F1172-5825-4FAB-A83D-3714FA7EF00F}"/>
-              </a:ext>
-            </a:extLst>
-          </p:cNvPr>
-          <p:cNvSpPr txBox="1"/>
-          <p:nvPr/>
-        </p:nvSpPr>
-        <p:spPr>
-          <a:xfrm>
-            <a:off x="3042283" y="3336552"/>
-            <a:ext cx="1027845" cy="338554"/>
-          </a:xfrm>
-          <a:prstGeom prst="rect">
-            <a:avLst/>
-          </a:prstGeom>
-          <a:noFill/>
-        </p:spPr>
-        <p:txBody>
-          <a:bodyPr wrap="none" rtlCol="0">
-            <a:spAutoFit/>
-          </a:bodyPr>
-          <a:lstStyle/>
-          <a:p>
-            <a:pPr algn="ctr"/>
-            <a:r>
-              <a:rPr lang="it-IT" sz="800" dirty="0"/>
-              <a:t>Press the ‘Shopping </a:t>
-            </a:r>
-          </a:p>
-          <a:p>
-            <a:pPr algn="ctr"/>
-            <a:r>
-              <a:rPr lang="it-IT" sz="800" dirty="0"/>
-              <a:t>basket’ </a:t>
-            </a:r>
-            <a:r>
-              <a:rPr lang="it-IT" sz="800" dirty="0" err="1"/>
-              <a:t>button</a:t>
-            </a:r>
-            <a:endParaRPr lang="it-IT" sz="800" dirty="0"/>
-          </a:p>
-        </p:txBody>
-      </p:sp>
-      <p:sp>
-        <p:nvSpPr>
-          <p:cNvPr id="104" name="CasellaDiTesto 103">
-            <a:extLst>
-              <a:ext uri="{FF2B5EF4-FFF2-40B4-BE49-F238E27FC236}">
-                <a16:creationId xmlns:a16="http://schemas.microsoft.com/office/drawing/2014/main" id="{F9B5BDC1-5A3C-4114-8027-6A369E17FD58}"/>
-              </a:ext>
-            </a:extLst>
-          </p:cNvPr>
-          <p:cNvSpPr txBox="1"/>
-          <p:nvPr/>
-        </p:nvSpPr>
-        <p:spPr>
-          <a:xfrm>
-            <a:off x="4283838" y="5384642"/>
-            <a:ext cx="1005403" cy="338554"/>
-          </a:xfrm>
-          <a:prstGeom prst="rect">
-            <a:avLst/>
-          </a:prstGeom>
-          <a:noFill/>
-        </p:spPr>
-        <p:txBody>
-          <a:bodyPr wrap="none" rtlCol="0">
-            <a:spAutoFit/>
-          </a:bodyPr>
-          <a:lstStyle/>
-          <a:p>
-            <a:pPr algn="ctr"/>
-            <a:r>
-              <a:rPr lang="it-IT" sz="800" dirty="0"/>
-              <a:t>Press the ‘</a:t>
-            </a:r>
-            <a:r>
-              <a:rPr lang="it-IT" sz="800" dirty="0" err="1"/>
-              <a:t>Send</a:t>
-            </a:r>
-            <a:r>
-              <a:rPr lang="it-IT" sz="800" dirty="0"/>
-              <a:t> the </a:t>
-            </a:r>
-          </a:p>
-          <a:p>
-            <a:pPr algn="ctr"/>
-            <a:r>
-              <a:rPr lang="it-IT" sz="800" dirty="0" err="1"/>
-              <a:t>order</a:t>
-            </a:r>
-            <a:r>
-              <a:rPr lang="it-IT" sz="800" dirty="0"/>
-              <a:t>’ </a:t>
-            </a:r>
-            <a:r>
-              <a:rPr lang="it-IT" sz="800" dirty="0" err="1"/>
-              <a:t>button</a:t>
-            </a:r>
-            <a:endParaRPr lang="it-IT" sz="800" dirty="0"/>
-          </a:p>
-        </p:txBody>
-      </p:sp>
-      <p:sp>
-        <p:nvSpPr>
-          <p:cNvPr id="114" name="Titolo 113">
-            <a:extLst>
-              <a:ext uri="{FF2B5EF4-FFF2-40B4-BE49-F238E27FC236}">
-                <a16:creationId xmlns:a16="http://schemas.microsoft.com/office/drawing/2014/main" id="{45C0AF18-60B4-4DD9-BE7C-840BDB44D47C}"/>
-              </a:ext>
-            </a:extLst>
-          </p:cNvPr>
-          <p:cNvSpPr>
-            <a:spLocks noGrp="1"/>
-          </p:cNvSpPr>
-          <p:nvPr>
-            <p:ph type="ctrTitle"/>
-          </p:nvPr>
-        </p:nvSpPr>
-        <p:spPr>
-          <a:xfrm>
-            <a:off x="1247314" y="341787"/>
-            <a:ext cx="9144000" cy="705081"/>
-          </a:xfrm>
-        </p:spPr>
-        <p:txBody>
-          <a:bodyPr>
-            <a:normAutofit/>
-          </a:bodyPr>
-          <a:lstStyle/>
-          <a:p>
-            <a:r>
-              <a:rPr lang="it-IT" sz="4000" dirty="0"/>
-              <a:t>STN Customer: </a:t>
-            </a:r>
-            <a:r>
-              <a:rPr lang="it-IT" sz="4000" dirty="0" err="1"/>
-              <a:t>Fill</a:t>
-            </a:r>
-            <a:r>
-              <a:rPr lang="it-IT" sz="4000" dirty="0"/>
-              <a:t> shopping basket</a:t>
-            </a:r>
-          </a:p>
-        </p:txBody>
-      </p:sp>
+      <p:cxnSp>
+        <p:nvCxnSpPr>
+          <p:cNvPr id="49" name="Connettore 2 48">
+            <a:extLst>
+              <a:ext uri="{FF2B5EF4-FFF2-40B4-BE49-F238E27FC236}">
+                <a16:creationId xmlns:a16="http://schemas.microsoft.com/office/drawing/2014/main" id="{449E8C4D-054D-4E93-B183-5D054B55D255}"/>
+              </a:ext>
+            </a:extLst>
+          </p:cNvPr>
+          <p:cNvCxnSpPr>
+            <a:cxnSpLocks/>
+            <a:stCxn id="26" idx="3"/>
+            <a:endCxn id="5" idx="5"/>
+          </p:cNvCxnSpPr>
+          <p:nvPr/>
+        </p:nvCxnSpPr>
+        <p:spPr>
+          <a:xfrm flipH="1">
+            <a:off x="4179721" y="2206172"/>
+            <a:ext cx="1578893" cy="27167"/>
+          </a:xfrm>
+          <a:prstGeom prst="straightConnector1">
+            <a:avLst/>
+          </a:prstGeom>
+          <a:ln>
+            <a:solidFill>
+              <a:schemeClr val="tx1"/>
+            </a:solidFill>
+            <a:tailEnd type="triangle"/>
+          </a:ln>
+        </p:spPr>
+        <p:style>
+          <a:lnRef idx="1">
+            <a:schemeClr val="accent1"/>
+          </a:lnRef>
+          <a:fillRef idx="0">
+            <a:schemeClr val="accent1"/>
+          </a:fillRef>
+          <a:effectRef idx="0">
+            <a:schemeClr val="accent1"/>
+          </a:effectRef>
+          <a:fontRef idx="minor">
+            <a:schemeClr val="tx1"/>
+          </a:fontRef>
+        </p:style>
+      </p:cxnSp>
+      <p:cxnSp>
+        <p:nvCxnSpPr>
+          <p:cNvPr id="52" name="Connettore 2 51">
+            <a:extLst>
+              <a:ext uri="{FF2B5EF4-FFF2-40B4-BE49-F238E27FC236}">
+                <a16:creationId xmlns:a16="http://schemas.microsoft.com/office/drawing/2014/main" id="{B4D0B90C-4693-4537-92FA-692FD64A52BB}"/>
+              </a:ext>
+            </a:extLst>
+          </p:cNvPr>
+          <p:cNvCxnSpPr>
+            <a:cxnSpLocks/>
+            <a:stCxn id="26" idx="7"/>
+            <a:endCxn id="48" idx="1"/>
+          </p:cNvCxnSpPr>
+          <p:nvPr/>
+        </p:nvCxnSpPr>
+        <p:spPr>
+          <a:xfrm flipV="1">
+            <a:off x="6996653" y="1890902"/>
+            <a:ext cx="1848870" cy="1"/>
+          </a:xfrm>
+          <a:prstGeom prst="straightConnector1">
+            <a:avLst/>
+          </a:prstGeom>
+          <a:ln>
+            <a:solidFill>
+              <a:schemeClr val="tx1"/>
+            </a:solidFill>
+            <a:tailEnd type="triangle"/>
+          </a:ln>
+        </p:spPr>
+        <p:style>
+          <a:lnRef idx="1">
+            <a:schemeClr val="accent1"/>
+          </a:lnRef>
+          <a:fillRef idx="0">
+            <a:schemeClr val="accent1"/>
+          </a:fillRef>
+          <a:effectRef idx="0">
+            <a:schemeClr val="accent1"/>
+          </a:effectRef>
+          <a:fontRef idx="minor">
+            <a:schemeClr val="tx1"/>
+          </a:fontRef>
+        </p:style>
+      </p:cxnSp>
+      <p:cxnSp>
+        <p:nvCxnSpPr>
+          <p:cNvPr id="53" name="Connettore 2 52">
+            <a:extLst>
+              <a:ext uri="{FF2B5EF4-FFF2-40B4-BE49-F238E27FC236}">
+                <a16:creationId xmlns:a16="http://schemas.microsoft.com/office/drawing/2014/main" id="{FD8199D7-3481-4800-8A87-3A6AD43291A7}"/>
+              </a:ext>
+            </a:extLst>
+          </p:cNvPr>
+          <p:cNvCxnSpPr>
+            <a:cxnSpLocks/>
+            <a:stCxn id="48" idx="3"/>
+            <a:endCxn id="26" idx="5"/>
+          </p:cNvCxnSpPr>
+          <p:nvPr/>
+        </p:nvCxnSpPr>
+        <p:spPr>
+          <a:xfrm flipH="1">
+            <a:off x="6996653" y="2206171"/>
+            <a:ext cx="1848870" cy="1"/>
+          </a:xfrm>
+          <a:prstGeom prst="straightConnector1">
+            <a:avLst/>
+          </a:prstGeom>
+          <a:ln>
+            <a:solidFill>
+              <a:schemeClr val="tx1"/>
+            </a:solidFill>
+            <a:tailEnd type="triangle"/>
+          </a:ln>
+        </p:spPr>
+        <p:style>
+          <a:lnRef idx="1">
+            <a:schemeClr val="accent1"/>
+          </a:lnRef>
+          <a:fillRef idx="0">
+            <a:schemeClr val="accent1"/>
+          </a:fillRef>
+          <a:effectRef idx="0">
+            <a:schemeClr val="accent1"/>
+          </a:effectRef>
+          <a:fontRef idx="minor">
+            <a:schemeClr val="tx1"/>
+          </a:fontRef>
+        </p:style>
+      </p:cxnSp>
+      <p:cxnSp>
+        <p:nvCxnSpPr>
+          <p:cNvPr id="59" name="Connettore 2 58">
+            <a:extLst>
+              <a:ext uri="{FF2B5EF4-FFF2-40B4-BE49-F238E27FC236}">
+                <a16:creationId xmlns:a16="http://schemas.microsoft.com/office/drawing/2014/main" id="{6B27FCE9-7C18-442E-AB39-230392A32D32}"/>
+              </a:ext>
+            </a:extLst>
+          </p:cNvPr>
+          <p:cNvCxnSpPr>
+            <a:cxnSpLocks/>
+            <a:stCxn id="5" idx="4"/>
+            <a:endCxn id="81" idx="0"/>
+          </p:cNvCxnSpPr>
+          <p:nvPr/>
+        </p:nvCxnSpPr>
+        <p:spPr>
+          <a:xfrm>
+            <a:off x="3560702" y="2298633"/>
+            <a:ext cx="43738" cy="1814878"/>
+          </a:xfrm>
+          <a:prstGeom prst="straightConnector1">
+            <a:avLst/>
+          </a:prstGeom>
+          <a:ln>
+            <a:solidFill>
+              <a:schemeClr val="tx1"/>
+            </a:solidFill>
+            <a:tailEnd type="triangle"/>
+          </a:ln>
+        </p:spPr>
+        <p:style>
+          <a:lnRef idx="1">
+            <a:schemeClr val="accent1"/>
+          </a:lnRef>
+          <a:fillRef idx="0">
+            <a:schemeClr val="accent1"/>
+          </a:fillRef>
+          <a:effectRef idx="0">
+            <a:schemeClr val="accent1"/>
+          </a:effectRef>
+          <a:fontRef idx="minor">
+            <a:schemeClr val="tx1"/>
+          </a:fontRef>
+        </p:style>
+      </p:cxnSp>
+      <p:cxnSp>
+        <p:nvCxnSpPr>
+          <p:cNvPr id="62" name="Connettore 2 61">
+            <a:extLst>
+              <a:ext uri="{FF2B5EF4-FFF2-40B4-BE49-F238E27FC236}">
+                <a16:creationId xmlns:a16="http://schemas.microsoft.com/office/drawing/2014/main" id="{ADB211A8-5806-4D49-8D77-6D36C0A4F540}"/>
+              </a:ext>
+            </a:extLst>
+          </p:cNvPr>
+          <p:cNvCxnSpPr>
+            <a:cxnSpLocks/>
+            <a:stCxn id="81" idx="4"/>
+            <a:endCxn id="2" idx="0"/>
+          </p:cNvCxnSpPr>
+          <p:nvPr/>
+        </p:nvCxnSpPr>
+        <p:spPr>
+          <a:xfrm>
+            <a:off x="3604440" y="4559368"/>
+            <a:ext cx="1" cy="965367"/>
+          </a:xfrm>
+          <a:prstGeom prst="straightConnector1">
+            <a:avLst/>
+          </a:prstGeom>
+          <a:ln>
+            <a:solidFill>
+              <a:schemeClr val="tx1"/>
+            </a:solidFill>
+            <a:tailEnd type="triangle"/>
+          </a:ln>
+        </p:spPr>
+        <p:style>
+          <a:lnRef idx="1">
+            <a:schemeClr val="accent1"/>
+          </a:lnRef>
+          <a:fillRef idx="0">
+            <a:schemeClr val="accent1"/>
+          </a:fillRef>
+          <a:effectRef idx="0">
+            <a:schemeClr val="accent1"/>
+          </a:effectRef>
+          <a:fontRef idx="minor">
+            <a:schemeClr val="tx1"/>
+          </a:fontRef>
+        </p:style>
+      </p:cxnSp>
     </p:spTree>
     <p:extLst>
       <p:ext uri="{BB962C8B-B14F-4D97-AF65-F5344CB8AC3E}">

</xml_diff>